<commit_message>
ebauche 2 fin ssh debut github
</commit_message>
<xml_diff>
--- a/formationAnsibleetJenkins.pptx
+++ b/formationAnsibleetJenkins.pptx
@@ -5,7 +5,7 @@
     <p:sldMasterId id="2147483648" r:id="rId1"/>
   </p:sldMasterIdLst>
   <p:notesMasterIdLst>
-    <p:notesMasterId r:id="rId15"/>
+    <p:notesMasterId r:id="rId16"/>
   </p:notesMasterIdLst>
   <p:sldIdLst>
     <p:sldId id="256" r:id="rId2"/>
@@ -21,6 +21,7 @@
     <p:sldId id="267" r:id="rId12"/>
     <p:sldId id="270" r:id="rId13"/>
     <p:sldId id="269" r:id="rId14"/>
+    <p:sldId id="271" r:id="rId15"/>
   </p:sldIdLst>
   <p:sldSz cx="12192000" cy="6858000"/>
   <p:notesSz cx="6858000" cy="9144000"/>
@@ -2619,6 +2620,90 @@
 </inkml:ink>
 </file>
 
+<file path=ppt/ink/ink90.xml><?xml version="1.0" encoding="utf-8"?>
+<inkml:ink xmlns:inkml="http://www.w3.org/2003/InkML">
+  <inkml:definitions>
+    <inkml:context xml:id="ctx0">
+      <inkml:inkSource xml:id="inkSrc0">
+        <inkml:traceFormat>
+          <inkml:channel name="X" type="integer" min="-2.14748E9" max="2.14748E9" units="cm"/>
+          <inkml:channel name="Y" type="integer" min="-2.14748E9" max="2.14748E9" units="cm"/>
+          <inkml:channel name="F" type="integer" max="32767" units="dev"/>
+        </inkml:traceFormat>
+        <inkml:channelProperties>
+          <inkml:channelProperty channel="X" name="resolution" value="1000" units="1/cm"/>
+          <inkml:channelProperty channel="Y" name="resolution" value="1000" units="1/cm"/>
+          <inkml:channelProperty channel="F" name="resolution" value="0" units="1/dev"/>
+        </inkml:channelProperties>
+      </inkml:inkSource>
+      <inkml:timestamp xml:id="ts0" timeString="2024-05-05T00:02:46.461"/>
+    </inkml:context>
+    <inkml:brush xml:id="br0">
+      <inkml:brushProperty name="width" value="0.05" units="cm"/>
+      <inkml:brushProperty name="height" value="0.05" units="cm"/>
+      <inkml:brushProperty name="color" value="#FFFFFF"/>
+    </inkml:brush>
+  </inkml:definitions>
+  <inkml:trace contextRef="#ctx0" brushRef="#br0">1 68 24575,'1552'0'0,"-1531"-1"0,1-2 0,-1 0 0,0-2 0,-1 0 0,30-11 0,-28 8 0,0 1 0,1 1 0,0 1 0,29-3 0,44 7-1365,-67 2-5461</inkml:trace>
+</inkml:ink>
+</file>
+
+<file path=ppt/ink/ink91.xml><?xml version="1.0" encoding="utf-8"?>
+<inkml:ink xmlns:inkml="http://www.w3.org/2003/InkML">
+  <inkml:definitions>
+    <inkml:context xml:id="ctx0">
+      <inkml:inkSource xml:id="inkSrc0">
+        <inkml:traceFormat>
+          <inkml:channel name="X" type="integer" min="-2.14748E9" max="2.14748E9" units="cm"/>
+          <inkml:channel name="Y" type="integer" min="-2.14748E9" max="2.14748E9" units="cm"/>
+          <inkml:channel name="F" type="integer" max="32767" units="dev"/>
+        </inkml:traceFormat>
+        <inkml:channelProperties>
+          <inkml:channelProperty channel="X" name="resolution" value="1000" units="1/cm"/>
+          <inkml:channelProperty channel="Y" name="resolution" value="1000" units="1/cm"/>
+          <inkml:channelProperty channel="F" name="resolution" value="0" units="1/dev"/>
+        </inkml:channelProperties>
+      </inkml:inkSource>
+      <inkml:timestamp xml:id="ts0" timeString="2024-05-02T20:36:45.741"/>
+    </inkml:context>
+    <inkml:brush xml:id="br0">
+      <inkml:brushProperty name="width" value="0.05" units="cm"/>
+      <inkml:brushProperty name="height" value="0.05" units="cm"/>
+      <inkml:brushProperty name="color" value="#FFFFFF"/>
+    </inkml:brush>
+  </inkml:definitions>
+  <inkml:trace contextRef="#ctx0" brushRef="#br0">1 1 24575,'0'0'-8191</inkml:trace>
+</inkml:ink>
+</file>
+
+<file path=ppt/ink/ink92.xml><?xml version="1.0" encoding="utf-8"?>
+<inkml:ink xmlns:inkml="http://www.w3.org/2003/InkML">
+  <inkml:definitions>
+    <inkml:context xml:id="ctx0">
+      <inkml:inkSource xml:id="inkSrc0">
+        <inkml:traceFormat>
+          <inkml:channel name="X" type="integer" min="-2.14748E9" max="2.14748E9" units="cm"/>
+          <inkml:channel name="Y" type="integer" min="-2.14748E9" max="2.14748E9" units="cm"/>
+          <inkml:channel name="F" type="integer" max="32767" units="dev"/>
+        </inkml:traceFormat>
+        <inkml:channelProperties>
+          <inkml:channelProperty channel="X" name="resolution" value="1000" units="1/cm"/>
+          <inkml:channelProperty channel="Y" name="resolution" value="1000" units="1/cm"/>
+          <inkml:channelProperty channel="F" name="resolution" value="0" units="1/dev"/>
+        </inkml:channelProperties>
+      </inkml:inkSource>
+      <inkml:timestamp xml:id="ts0" timeString="2024-05-02T21:01:42.381"/>
+    </inkml:context>
+    <inkml:brush xml:id="br0">
+      <inkml:brushProperty name="width" value="0.05" units="cm"/>
+      <inkml:brushProperty name="height" value="0.05" units="cm"/>
+      <inkml:brushProperty name="color" value="#E71224"/>
+    </inkml:brush>
+  </inkml:definitions>
+  <inkml:trace contextRef="#ctx0" brushRef="#br0">1 1 24575,'0'0'-8191</inkml:trace>
+</inkml:ink>
+</file>
+
 <file path=ppt/notesMasters/notesMaster1.xml><?xml version="1.0" encoding="utf-8"?>
 <p:notesMaster xmlns:a="http://schemas.openxmlformats.org/drawingml/2006/main" xmlns:r="http://schemas.openxmlformats.org/officeDocument/2006/relationships" xmlns:p="http://schemas.openxmlformats.org/presentationml/2006/main">
   <p:cSld>
@@ -2701,7 +2786,7 @@
           <a:p>
             <a:fld id="{B465EC35-40D6-4C85-8FC9-F5FA24701962}" type="datetimeFigureOut">
               <a:rPr lang="fr-FR" smtClean="0"/>
-              <a:t>02/05/2024</a:t>
+              <a:t>04/05/2024</a:t>
             </a:fld>
             <a:endParaRPr lang="fr-FR"/>
           </a:p>
@@ -3427,6 +3512,118 @@
 </p:notes>
 </file>
 
+<file path=ppt/notesSlides/notesSlide13.xml><?xml version="1.0" encoding="utf-8"?>
+<p:notes xmlns:a="http://schemas.openxmlformats.org/drawingml/2006/main" xmlns:r="http://schemas.openxmlformats.org/officeDocument/2006/relationships" xmlns:p="http://schemas.openxmlformats.org/presentationml/2006/main">
+  <p:cSld>
+    <p:spTree>
+      <p:nvGrpSpPr>
+        <p:cNvPr id="1" name=""/>
+        <p:cNvGrpSpPr/>
+        <p:nvPr/>
+      </p:nvGrpSpPr>
+      <p:grpSpPr>
+        <a:xfrm>
+          <a:off x="0" y="0"/>
+          <a:ext cx="0" cy="0"/>
+          <a:chOff x="0" y="0"/>
+          <a:chExt cx="0" cy="0"/>
+        </a:xfrm>
+      </p:grpSpPr>
+      <p:sp>
+        <p:nvSpPr>
+          <p:cNvPr id="2" name="Espace réservé de l'image des diapositives 1"/>
+          <p:cNvSpPr>
+            <a:spLocks noGrp="1" noRot="1" noChangeAspect="1"/>
+          </p:cNvSpPr>
+          <p:nvPr>
+            <p:ph type="sldImg"/>
+          </p:nvPr>
+        </p:nvSpPr>
+        <p:spPr/>
+      </p:sp>
+      <p:sp>
+        <p:nvSpPr>
+          <p:cNvPr id="3" name="Espace réservé des notes 2"/>
+          <p:cNvSpPr>
+            <a:spLocks noGrp="1"/>
+          </p:cNvSpPr>
+          <p:nvPr>
+            <p:ph type="body" idx="1"/>
+          </p:nvPr>
+        </p:nvSpPr>
+        <p:spPr/>
+        <p:txBody>
+          <a:bodyPr/>
+          <a:lstStyle/>
+          <a:p>
+            <a:r>
+              <a:rPr lang="fr-FR" b="0" i="0" dirty="0">
+                <a:solidFill>
+                  <a:srgbClr val="0D0D0D"/>
+                </a:solidFill>
+                <a:effectLst/>
+                <a:highlight>
+                  <a:srgbClr val="FFFFFF"/>
+                </a:highlight>
+                <a:latin typeface="Söhne"/>
+              </a:rPr>
+              <a:t>SSH signifie Secure Shell. C'est un protocole réseau cryptographique qui permet la communication sécurisée entre deux ordinateurs via un réseau non sécurisé. SSH est couramment utilisé pour la connexion distante à des serveurs et d'autres systèmes sur un réseau, permettant aux utilisateurs d'accéder et de gérer des ressources de manière sécurisée. Il fournit des mécanismes de cryptage et d'authentification robustes, ce qui en fait un choix populaire pour l'administration distante sécurisée et le transfert de fichiers.</a:t>
+            </a:r>
+          </a:p>
+          <a:p>
+            <a:r>
+              <a:rPr lang="fr-FR" b="0" i="0" dirty="0">
+                <a:solidFill>
+                  <a:srgbClr val="0D0D0D"/>
+                </a:solidFill>
+                <a:effectLst/>
+                <a:highlight>
+                  <a:srgbClr val="FFFFFF"/>
+                </a:highlight>
+                <a:latin typeface="Söhne"/>
+              </a:rPr>
+              <a:t>Ansible recourt à SSH pour réaliser une provision sécurisée de serveurs distants.</a:t>
+            </a:r>
+            <a:endParaRPr lang="fr-FR" dirty="0"/>
+          </a:p>
+        </p:txBody>
+      </p:sp>
+      <p:sp>
+        <p:nvSpPr>
+          <p:cNvPr id="4" name="Espace réservé du numéro de diapositive 3"/>
+          <p:cNvSpPr>
+            <a:spLocks noGrp="1"/>
+          </p:cNvSpPr>
+          <p:nvPr>
+            <p:ph type="sldNum" sz="quarter" idx="5"/>
+          </p:nvPr>
+        </p:nvSpPr>
+        <p:spPr/>
+        <p:txBody>
+          <a:bodyPr/>
+          <a:lstStyle/>
+          <a:p>
+            <a:fld id="{4699F8F6-3164-46DA-A6CF-FC0368D075AB}" type="slidenum">
+              <a:rPr lang="fr-FR" smtClean="0"/>
+              <a:t>14</a:t>
+            </a:fld>
+            <a:endParaRPr lang="fr-FR"/>
+          </a:p>
+        </p:txBody>
+      </p:sp>
+    </p:spTree>
+    <p:extLst>
+      <p:ext uri="{BB962C8B-B14F-4D97-AF65-F5344CB8AC3E}">
+        <p14:creationId xmlns:p14="http://schemas.microsoft.com/office/powerpoint/2010/main" val="1830107654"/>
+      </p:ext>
+    </p:extLst>
+  </p:cSld>
+  <p:clrMapOvr>
+    <a:masterClrMapping/>
+  </p:clrMapOvr>
+</p:notes>
+</file>
+
 <file path=ppt/notesSlides/notesSlide2.xml><?xml version="1.0" encoding="utf-8"?>
 <p:notes xmlns:a="http://schemas.openxmlformats.org/drawingml/2006/main" xmlns:r="http://schemas.openxmlformats.org/officeDocument/2006/relationships" xmlns:p="http://schemas.openxmlformats.org/presentationml/2006/main">
   <p:cSld>
@@ -4992,7 +5189,7 @@
           <a:p>
             <a:fld id="{6673ECEF-1D77-43AE-9140-E2396EBC32DB}" type="datetime1">
               <a:rPr lang="fr-FR" smtClean="0"/>
-              <a:t>02/05/2024</a:t>
+              <a:t>04/05/2024</a:t>
             </a:fld>
             <a:endParaRPr lang="fr-FR"/>
           </a:p>
@@ -5193,7 +5390,7 @@
           <a:p>
             <a:fld id="{466B9F22-C239-43FE-B878-58835F365FC5}" type="datetime1">
               <a:rPr lang="fr-FR" smtClean="0"/>
-              <a:t>02/05/2024</a:t>
+              <a:t>04/05/2024</a:t>
             </a:fld>
             <a:endParaRPr lang="fr-FR"/>
           </a:p>
@@ -5404,7 +5601,7 @@
           <a:p>
             <a:fld id="{9C0F3576-F52B-4D10-9CFF-D87B2DEBE3E4}" type="datetime1">
               <a:rPr lang="fr-FR" smtClean="0"/>
-              <a:t>02/05/2024</a:t>
+              <a:t>04/05/2024</a:t>
             </a:fld>
             <a:endParaRPr lang="fr-FR"/>
           </a:p>
@@ -5605,7 +5802,7 @@
           <a:p>
             <a:fld id="{941C9732-2A01-4D08-B92E-42AC3CE0EE63}" type="datetime1">
               <a:rPr lang="fr-FR" smtClean="0"/>
-              <a:t>02/05/2024</a:t>
+              <a:t>04/05/2024</a:t>
             </a:fld>
             <a:endParaRPr lang="fr-FR"/>
           </a:p>
@@ -5883,7 +6080,7 @@
           <a:p>
             <a:fld id="{8C38BF5A-5A7B-4775-9304-9725F9836571}" type="datetime1">
               <a:rPr lang="fr-FR" smtClean="0"/>
-              <a:t>02/05/2024</a:t>
+              <a:t>04/05/2024</a:t>
             </a:fld>
             <a:endParaRPr lang="fr-FR"/>
           </a:p>
@@ -6151,7 +6348,7 @@
           <a:p>
             <a:fld id="{50A303E5-E01C-478A-982C-4FF999ADDC34}" type="datetime1">
               <a:rPr lang="fr-FR" smtClean="0"/>
-              <a:t>02/05/2024</a:t>
+              <a:t>04/05/2024</a:t>
             </a:fld>
             <a:endParaRPr lang="fr-FR"/>
           </a:p>
@@ -6566,7 +6763,7 @@
           <a:p>
             <a:fld id="{30965E43-F543-4F23-A9B5-E7537237DA3E}" type="datetime1">
               <a:rPr lang="fr-FR" smtClean="0"/>
-              <a:t>02/05/2024</a:t>
+              <a:t>04/05/2024</a:t>
             </a:fld>
             <a:endParaRPr lang="fr-FR"/>
           </a:p>
@@ -6710,7 +6907,7 @@
           <a:p>
             <a:fld id="{C58BDF5C-078D-479F-BA03-88A11C66015C}" type="datetime1">
               <a:rPr lang="fr-FR" smtClean="0"/>
-              <a:t>02/05/2024</a:t>
+              <a:t>04/05/2024</a:t>
             </a:fld>
             <a:endParaRPr lang="fr-FR"/>
           </a:p>
@@ -6826,7 +7023,7 @@
           <a:p>
             <a:fld id="{5E865842-71E2-4BC3-BAAB-AD09CA53D33D}" type="datetime1">
               <a:rPr lang="fr-FR" smtClean="0"/>
-              <a:t>02/05/2024</a:t>
+              <a:t>04/05/2024</a:t>
             </a:fld>
             <a:endParaRPr lang="fr-FR"/>
           </a:p>
@@ -7140,7 +7337,7 @@
           <a:p>
             <a:fld id="{3FA46A2A-EA15-4023-AF98-1C287279A5F3}" type="datetime1">
               <a:rPr lang="fr-FR" smtClean="0"/>
-              <a:t>02/05/2024</a:t>
+              <a:t>04/05/2024</a:t>
             </a:fld>
             <a:endParaRPr lang="fr-FR"/>
           </a:p>
@@ -7431,7 +7628,7 @@
           <a:p>
             <a:fld id="{9A50EFF0-CDF3-4BDD-A628-3D3A2CBC3A3B}" type="datetime1">
               <a:rPr lang="fr-FR" smtClean="0"/>
-              <a:t>02/05/2024</a:t>
+              <a:t>04/05/2024</a:t>
             </a:fld>
             <a:endParaRPr lang="fr-FR"/>
           </a:p>
@@ -7675,7 +7872,7 @@
           <a:p>
             <a:fld id="{4BC3AB77-036A-4F77-986B-D4A79F4B0D6E}" type="datetime1">
               <a:rPr lang="fr-FR" smtClean="0"/>
-              <a:t>02/05/2024</a:t>
+              <a:t>04/05/2024</a:t>
             </a:fld>
             <a:endParaRPr lang="fr-FR"/>
           </a:p>
@@ -9156,8 +9353,8 @@
           </a:p>
         </p:txBody>
       </p:sp>
-      <mc:AlternateContent xmlns:mc="http://schemas.openxmlformats.org/markup-compatibility/2006">
-        <mc:Choice xmlns:p14="http://schemas.microsoft.com/office/powerpoint/2010/main" Requires="p14">
+      <mc:AlternateContent xmlns:mc="http://schemas.openxmlformats.org/markup-compatibility/2006" xmlns:p14="http://schemas.microsoft.com/office/powerpoint/2010/main">
+        <mc:Choice Requires="p14">
           <p:contentPart p14:bwMode="auto" r:id="rId6">
             <p14:nvContentPartPr>
               <p14:cNvPr id="20" name="Encre 19">
@@ -9176,7 +9373,7 @@
             </p14:xfrm>
           </p:contentPart>
         </mc:Choice>
-        <mc:Fallback>
+        <mc:Fallback xmlns="">
           <p:pic>
             <p:nvPicPr>
               <p:cNvPr id="20" name="Encre 19">
@@ -9207,8 +9404,8 @@
           </p:pic>
         </mc:Fallback>
       </mc:AlternateContent>
-      <mc:AlternateContent xmlns:mc="http://schemas.openxmlformats.org/markup-compatibility/2006">
-        <mc:Choice xmlns:p14="http://schemas.microsoft.com/office/powerpoint/2010/main" Requires="p14">
+      <mc:AlternateContent xmlns:mc="http://schemas.openxmlformats.org/markup-compatibility/2006" xmlns:p14="http://schemas.microsoft.com/office/powerpoint/2010/main">
+        <mc:Choice Requires="p14">
           <p:contentPart p14:bwMode="auto" r:id="rId8">
             <p14:nvContentPartPr>
               <p14:cNvPr id="21" name="Encre 20">
@@ -9227,7 +9424,7 @@
             </p14:xfrm>
           </p:contentPart>
         </mc:Choice>
-        <mc:Fallback>
+        <mc:Fallback xmlns="">
           <p:pic>
             <p:nvPicPr>
               <p:cNvPr id="21" name="Encre 20">
@@ -9293,7 +9490,7 @@
                   </a:schemeClr>
                 </a:solidFill>
               </a:rPr>
-              <a:t>02/05/2024</a:t>
+              <a:t>04/05/2024</a:t>
             </a:fld>
             <a:endParaRPr lang="fr-FR" dirty="0">
               <a:solidFill>
@@ -9409,8 +9606,8 @@
           </a:p>
         </p:txBody>
       </p:sp>
-      <mc:AlternateContent xmlns:mc="http://schemas.openxmlformats.org/markup-compatibility/2006">
-        <mc:Choice xmlns:p14="http://schemas.microsoft.com/office/powerpoint/2010/main" Requires="p14">
+      <mc:AlternateContent xmlns:mc="http://schemas.openxmlformats.org/markup-compatibility/2006" xmlns:p14="http://schemas.microsoft.com/office/powerpoint/2010/main">
+        <mc:Choice Requires="p14">
           <p:contentPart p14:bwMode="auto" r:id="rId10">
             <p14:nvContentPartPr>
               <p14:cNvPr id="32" name="Encre 31">
@@ -9429,7 +9626,7 @@
             </p14:xfrm>
           </p:contentPart>
         </mc:Choice>
-        <mc:Fallback>
+        <mc:Fallback xmlns="">
           <p:pic>
             <p:nvPicPr>
               <p:cNvPr id="32" name="Encre 31">
@@ -10180,8 +10377,8 @@
           </a:p>
         </p:txBody>
       </p:sp>
-      <mc:AlternateContent xmlns:mc="http://schemas.openxmlformats.org/markup-compatibility/2006">
-        <mc:Choice xmlns:p14="http://schemas.microsoft.com/office/powerpoint/2010/main" Requires="p14">
+      <mc:AlternateContent xmlns:mc="http://schemas.openxmlformats.org/markup-compatibility/2006" xmlns:p14="http://schemas.microsoft.com/office/powerpoint/2010/main">
+        <mc:Choice Requires="p14">
           <p:contentPart p14:bwMode="auto" r:id="rId13">
             <p14:nvContentPartPr>
               <p14:cNvPr id="35" name="Encre 34">
@@ -10200,7 +10397,7 @@
             </p14:xfrm>
           </p:contentPart>
         </mc:Choice>
-        <mc:Fallback>
+        <mc:Fallback xmlns="">
           <p:pic>
             <p:nvPicPr>
               <p:cNvPr id="35" name="Encre 34">
@@ -11406,8 +11603,8 @@
           </a:p>
         </p:txBody>
       </p:sp>
-      <mc:AlternateContent xmlns:mc="http://schemas.openxmlformats.org/markup-compatibility/2006">
-        <mc:Choice xmlns:p14="http://schemas.microsoft.com/office/powerpoint/2010/main" Requires="p14">
+      <mc:AlternateContent xmlns:mc="http://schemas.openxmlformats.org/markup-compatibility/2006" xmlns:p14="http://schemas.microsoft.com/office/powerpoint/2010/main">
+        <mc:Choice Requires="p14">
           <p:contentPart p14:bwMode="auto" r:id="rId6">
             <p14:nvContentPartPr>
               <p14:cNvPr id="21" name="Encre 20">
@@ -11426,7 +11623,7 @@
             </p14:xfrm>
           </p:contentPart>
         </mc:Choice>
-        <mc:Fallback>
+        <mc:Fallback xmlns="">
           <p:pic>
             <p:nvPicPr>
               <p:cNvPr id="21" name="Encre 20">
@@ -11492,7 +11689,7 @@
                   </a:schemeClr>
                 </a:solidFill>
               </a:rPr>
-              <a:t>02/05/2024</a:t>
+              <a:t>04/05/2024</a:t>
             </a:fld>
             <a:endParaRPr lang="fr-FR" dirty="0">
               <a:solidFill>
@@ -11608,8 +11805,8 @@
           </a:p>
         </p:txBody>
       </p:sp>
-      <mc:AlternateContent xmlns:mc="http://schemas.openxmlformats.org/markup-compatibility/2006">
-        <mc:Choice xmlns:p14="http://schemas.microsoft.com/office/powerpoint/2010/main" Requires="p14">
+      <mc:AlternateContent xmlns:mc="http://schemas.openxmlformats.org/markup-compatibility/2006" xmlns:p14="http://schemas.microsoft.com/office/powerpoint/2010/main">
+        <mc:Choice Requires="p14">
           <p:contentPart p14:bwMode="auto" r:id="rId8">
             <p14:nvContentPartPr>
               <p14:cNvPr id="32" name="Encre 31">
@@ -11628,7 +11825,7 @@
             </p14:xfrm>
           </p:contentPart>
         </mc:Choice>
-        <mc:Fallback>
+        <mc:Fallback xmlns="">
           <p:pic>
             <p:nvPicPr>
               <p:cNvPr id="32" name="Encre 31">
@@ -12789,8 +12986,8 @@
           </a:p>
         </p:txBody>
       </p:sp>
-      <mc:AlternateContent xmlns:mc="http://schemas.openxmlformats.org/markup-compatibility/2006">
-        <mc:Choice xmlns:p14="http://schemas.microsoft.com/office/powerpoint/2010/main" Requires="p14">
+      <mc:AlternateContent xmlns:mc="http://schemas.openxmlformats.org/markup-compatibility/2006" xmlns:p14="http://schemas.microsoft.com/office/powerpoint/2010/main">
+        <mc:Choice Requires="p14">
           <p:contentPart p14:bwMode="auto" r:id="rId6">
             <p14:nvContentPartPr>
               <p14:cNvPr id="21" name="Encre 20">
@@ -12809,7 +13006,7 @@
             </p14:xfrm>
           </p:contentPart>
         </mc:Choice>
-        <mc:Fallback>
+        <mc:Fallback xmlns="">
           <p:pic>
             <p:nvPicPr>
               <p:cNvPr id="21" name="Encre 20">
@@ -12875,7 +13072,7 @@
                   </a:schemeClr>
                 </a:solidFill>
               </a:rPr>
-              <a:t>02/05/2024</a:t>
+              <a:t>04/05/2024</a:t>
             </a:fld>
             <a:endParaRPr lang="fr-FR" dirty="0">
               <a:solidFill>
@@ -12991,8 +13188,8 @@
           </a:p>
         </p:txBody>
       </p:sp>
-      <mc:AlternateContent xmlns:mc="http://schemas.openxmlformats.org/markup-compatibility/2006">
-        <mc:Choice xmlns:p14="http://schemas.microsoft.com/office/powerpoint/2010/main" Requires="p14">
+      <mc:AlternateContent xmlns:mc="http://schemas.openxmlformats.org/markup-compatibility/2006" xmlns:p14="http://schemas.microsoft.com/office/powerpoint/2010/main">
+        <mc:Choice Requires="p14">
           <p:contentPart p14:bwMode="auto" r:id="rId8">
             <p14:nvContentPartPr>
               <p14:cNvPr id="32" name="Encre 31">
@@ -13011,7 +13208,7 @@
             </p14:xfrm>
           </p:contentPart>
         </mc:Choice>
-        <mc:Fallback>
+        <mc:Fallback xmlns="">
           <p:pic>
             <p:nvPicPr>
               <p:cNvPr id="32" name="Encre 31">
@@ -15142,7 +15339,7 @@
     </p:tnLst>
     <p:bldLst>
       <p:bldP spid="48" grpId="0" animBg="1"/>
-      <p:bldP spid="4" grpId="0"/>
+      <p:bldP spid="4" grpId="0" animBg="1"/>
       <p:bldP spid="13" grpId="0" animBg="1"/>
       <p:bldP spid="14" grpId="0" animBg="1"/>
       <p:bldP spid="16" grpId="0" animBg="1"/>
@@ -15151,7 +15348,7 @@
       <p:bldP spid="23" grpId="0" animBg="1"/>
       <p:bldP spid="24" grpId="0" animBg="1"/>
       <p:bldP spid="25" grpId="0" animBg="1"/>
-      <p:bldP spid="29" grpId="0"/>
+      <p:bldP spid="29" grpId="0" animBg="1"/>
     </p:bldLst>
   </p:timing>
 </p:sld>
@@ -15398,8 +15595,8 @@
           </a:prstGeom>
         </p:spPr>
       </p:pic>
-      <mc:AlternateContent xmlns:mc="http://schemas.openxmlformats.org/markup-compatibility/2006">
-        <mc:Choice xmlns:p14="http://schemas.microsoft.com/office/powerpoint/2010/main" Requires="p14">
+      <mc:AlternateContent xmlns:mc="http://schemas.openxmlformats.org/markup-compatibility/2006" xmlns:p14="http://schemas.microsoft.com/office/powerpoint/2010/main">
+        <mc:Choice Requires="p14">
           <p:contentPart p14:bwMode="auto" r:id="rId4">
             <p14:nvContentPartPr>
               <p14:cNvPr id="21" name="Encre 20">
@@ -15418,7 +15615,7 @@
             </p14:xfrm>
           </p:contentPart>
         </mc:Choice>
-        <mc:Fallback>
+        <mc:Fallback xmlns="">
           <p:pic>
             <p:nvPicPr>
               <p:cNvPr id="21" name="Encre 20">
@@ -15484,7 +15681,7 @@
                   </a:schemeClr>
                 </a:solidFill>
               </a:rPr>
-              <a:t>02/05/2024</a:t>
+              <a:t>05/05/2024</a:t>
             </a:fld>
             <a:endParaRPr lang="fr-FR" dirty="0">
               <a:solidFill>
@@ -15600,8 +15797,8 @@
           </a:p>
         </p:txBody>
       </p:sp>
-      <mc:AlternateContent xmlns:mc="http://schemas.openxmlformats.org/markup-compatibility/2006">
-        <mc:Choice xmlns:p14="http://schemas.microsoft.com/office/powerpoint/2010/main" Requires="p14">
+      <mc:AlternateContent xmlns:mc="http://schemas.openxmlformats.org/markup-compatibility/2006" xmlns:p14="http://schemas.microsoft.com/office/powerpoint/2010/main">
+        <mc:Choice Requires="p14">
           <p:contentPart p14:bwMode="auto" r:id="rId6">
             <p14:nvContentPartPr>
               <p14:cNvPr id="32" name="Encre 31">
@@ -15620,7 +15817,7 @@
             </p14:xfrm>
           </p:contentPart>
         </mc:Choice>
-        <mc:Fallback>
+        <mc:Fallback xmlns="">
           <p:pic>
             <p:nvPicPr>
               <p:cNvPr id="32" name="Encre 31">
@@ -15665,10 +15862,10 @@
         </p:nvGrpSpPr>
         <p:grpSpPr>
           <a:xfrm>
-            <a:off x="1641786" y="4049088"/>
-            <a:ext cx="844959" cy="449222"/>
+            <a:off x="1276079" y="3893990"/>
+            <a:ext cx="844959" cy="584120"/>
             <a:chOff x="1637189" y="2803427"/>
-            <a:chExt cx="1347806" cy="746779"/>
+            <a:chExt cx="1347806" cy="971032"/>
           </a:xfrm>
         </p:grpSpPr>
         <p:pic>
@@ -15743,7 +15940,7 @@
           <p:spPr>
             <a:xfrm>
               <a:off x="1637189" y="3211652"/>
-              <a:ext cx="1347806" cy="338554"/>
+              <a:ext cx="1347806" cy="562807"/>
             </a:xfrm>
             <a:prstGeom prst="rect">
               <a:avLst/>
@@ -15762,134 +15959,7 @@
                     <a:srgbClr val="FF0000"/>
                   </a:solidFill>
                 </a:rPr>
-                <a:t>privé</a:t>
-              </a:r>
-            </a:p>
-          </p:txBody>
-        </p:sp>
-      </p:grpSp>
-      <p:grpSp>
-        <p:nvGrpSpPr>
-          <p:cNvPr id="16" name="Groupe 15">
-            <a:extLst>
-              <a:ext uri="{FF2B5EF4-FFF2-40B4-BE49-F238E27FC236}">
-                <a16:creationId xmlns:a16="http://schemas.microsoft.com/office/drawing/2014/main" id="{7356E388-F405-94A7-C447-47B820D4ED19}"/>
-              </a:ext>
-            </a:extLst>
-          </p:cNvPr>
-          <p:cNvGrpSpPr/>
-          <p:nvPr/>
-        </p:nvGrpSpPr>
-        <p:grpSpPr>
-          <a:xfrm>
-            <a:off x="8722824" y="4286455"/>
-            <a:ext cx="973220" cy="449478"/>
-            <a:chOff x="7516494" y="2796995"/>
-            <a:chExt cx="1347805" cy="717711"/>
-          </a:xfrm>
-        </p:grpSpPr>
-        <p:pic>
-          <p:nvPicPr>
-            <p:cNvPr id="46" name="Picture 8" descr="Symbole clé (icône png) rouge">
-              <a:extLst>
-                <a:ext uri="{FF2B5EF4-FFF2-40B4-BE49-F238E27FC236}">
-                  <a16:creationId xmlns:a16="http://schemas.microsoft.com/office/drawing/2014/main" id="{1C184A75-2D68-6D85-0B15-A937FC524664}"/>
-                </a:ext>
-              </a:extLst>
-            </p:cNvPr>
-            <p:cNvPicPr>
-              <a:picLocks noChangeAspect="1" noChangeArrowheads="1"/>
-            </p:cNvPicPr>
-            <p:nvPr/>
-          </p:nvPicPr>
-          <p:blipFill>
-            <a:blip r:embed="rId8">
-              <a:clrChange>
-                <a:clrFrom>
-                  <a:srgbClr val="FFFFFF"/>
-                </a:clrFrom>
-                <a:clrTo>
-                  <a:srgbClr val="FFFFFF">
-                    <a:alpha val="0"/>
-                  </a:srgbClr>
-                </a:clrTo>
-              </a:clrChange>
-              <a:duotone>
-                <a:schemeClr val="accent3">
-                  <a:shade val="45000"/>
-                  <a:satMod val="135000"/>
-                </a:schemeClr>
-                <a:prstClr val="white"/>
-              </a:duotone>
-              <a:extLst>
-                <a:ext uri="{28A0092B-C50C-407E-A947-70E740481C1C}">
-                  <a14:useLocalDpi xmlns:a14="http://schemas.microsoft.com/office/drawing/2010/main" val="0"/>
-                </a:ext>
-              </a:extLst>
-            </a:blip>
-            <a:srcRect/>
-            <a:stretch>
-              <a:fillRect/>
-            </a:stretch>
-          </p:blipFill>
-          <p:spPr bwMode="auto">
-            <a:xfrm>
-              <a:off x="7574701" y="2796995"/>
-              <a:ext cx="606978" cy="606978"/>
-            </a:xfrm>
-            <a:prstGeom prst="rect">
-              <a:avLst/>
-            </a:prstGeom>
-            <a:noFill/>
-            <a:extLst>
-              <a:ext uri="{909E8E84-426E-40DD-AFC4-6F175D3DCCD1}">
-                <a14:hiddenFill xmlns:a14="http://schemas.microsoft.com/office/drawing/2010/main">
-                  <a:solidFill>
-                    <a:srgbClr val="FFFFFF"/>
-                  </a:solidFill>
-                </a14:hiddenFill>
-              </a:ext>
-            </a:extLst>
-          </p:spPr>
-        </p:pic>
-        <p:sp>
-          <p:nvSpPr>
-            <p:cNvPr id="47" name="ZoneTexte 46">
-              <a:extLst>
-                <a:ext uri="{FF2B5EF4-FFF2-40B4-BE49-F238E27FC236}">
-                  <a16:creationId xmlns:a16="http://schemas.microsoft.com/office/drawing/2014/main" id="{3007BFFD-71BE-5E80-9CBD-46D38FFD3F8E}"/>
-                </a:ext>
-              </a:extLst>
-            </p:cNvPr>
-            <p:cNvSpPr txBox="1"/>
-            <p:nvPr/>
-          </p:nvSpPr>
-          <p:spPr>
-            <a:xfrm>
-              <a:off x="7516494" y="3176150"/>
-              <a:ext cx="1347805" cy="338556"/>
-            </a:xfrm>
-            <a:prstGeom prst="rect">
-              <a:avLst/>
-            </a:prstGeom>
-            <a:noFill/>
-          </p:spPr>
-          <p:txBody>
-            <a:bodyPr wrap="square" rtlCol="0">
-              <a:spAutoFit/>
-            </a:bodyPr>
-            <a:lstStyle/>
-            <a:p>
-              <a:r>
-                <a:rPr lang="fr-FR" sz="1600" dirty="0">
-                  <a:solidFill>
-                    <a:schemeClr val="accent6">
-                      <a:lumMod val="60000"/>
-                      <a:lumOff val="40000"/>
-                    </a:schemeClr>
-                  </a:solidFill>
-                </a:rPr>
-                <a:t>pub</a:t>
+                <a:t>ansible</a:t>
               </a:r>
             </a:p>
           </p:txBody>
@@ -16412,408 +16482,598 @@
           </p:spPr>
         </p:pic>
       </p:grpSp>
-      <p:cxnSp>
-        <p:nvCxnSpPr>
-          <p:cNvPr id="23" name="Connecteur droit avec flèche 22">
+      <p:grpSp>
+        <p:nvGrpSpPr>
+          <p:cNvPr id="52" name="Groupe 51">
             <a:extLst>
               <a:ext uri="{FF2B5EF4-FFF2-40B4-BE49-F238E27FC236}">
-                <a16:creationId xmlns:a16="http://schemas.microsoft.com/office/drawing/2014/main" id="{A6E3A7E2-CFD0-D43D-1E33-88E7693740E2}"/>
+                <a16:creationId xmlns:a16="http://schemas.microsoft.com/office/drawing/2014/main" id="{C889664D-C473-9567-8C26-D56910E4879C}"/>
               </a:ext>
             </a:extLst>
           </p:cNvPr>
-          <p:cNvCxnSpPr>
-            <a:cxnSpLocks/>
-          </p:cNvCxnSpPr>
+          <p:cNvGrpSpPr/>
           <p:nvPr/>
-        </p:nvCxnSpPr>
-        <p:spPr>
-          <a:xfrm flipV="1">
-            <a:off x="2350796" y="4333122"/>
-            <a:ext cx="1979164" cy="13820"/>
+        </p:nvGrpSpPr>
+        <p:grpSpPr>
+          <a:xfrm>
+            <a:off x="2943492" y="4004783"/>
+            <a:ext cx="3372822" cy="1154539"/>
+            <a:chOff x="2943492" y="4004783"/>
+            <a:chExt cx="3372822" cy="1154539"/>
           </a:xfrm>
-          <a:prstGeom prst="straightConnector1">
-            <a:avLst/>
-          </a:prstGeom>
-          <a:ln>
-            <a:tailEnd type="triangle"/>
-          </a:ln>
-        </p:spPr>
-        <p:style>
-          <a:lnRef idx="2">
-            <a:schemeClr val="accent1"/>
-          </a:lnRef>
-          <a:fillRef idx="0">
-            <a:schemeClr val="accent1"/>
-          </a:fillRef>
-          <a:effectRef idx="1">
-            <a:schemeClr val="accent1"/>
-          </a:effectRef>
-          <a:fontRef idx="minor">
-            <a:schemeClr val="tx1"/>
-          </a:fontRef>
-        </p:style>
-      </p:cxnSp>
-      <p:sp>
-        <p:nvSpPr>
-          <p:cNvPr id="25" name="ZoneTexte 24">
+        </p:grpSpPr>
+        <p:cxnSp>
+          <p:nvCxnSpPr>
+            <p:cNvPr id="23" name="Connecteur droit avec flèche 22">
+              <a:extLst>
+                <a:ext uri="{FF2B5EF4-FFF2-40B4-BE49-F238E27FC236}">
+                  <a16:creationId xmlns:a16="http://schemas.microsoft.com/office/drawing/2014/main" id="{A6E3A7E2-CFD0-D43D-1E33-88E7693740E2}"/>
+                </a:ext>
+              </a:extLst>
+            </p:cNvPr>
+            <p:cNvCxnSpPr>
+              <a:cxnSpLocks/>
+            </p:cNvCxnSpPr>
+            <p:nvPr/>
+          </p:nvCxnSpPr>
+          <p:spPr>
+            <a:xfrm flipV="1">
+              <a:off x="3025393" y="4867435"/>
+              <a:ext cx="1979164" cy="13820"/>
+            </a:xfrm>
+            <a:prstGeom prst="straightConnector1">
+              <a:avLst/>
+            </a:prstGeom>
+            <a:ln>
+              <a:tailEnd type="triangle"/>
+            </a:ln>
+          </p:spPr>
+          <p:style>
+            <a:lnRef idx="2">
+              <a:schemeClr val="accent1"/>
+            </a:lnRef>
+            <a:fillRef idx="0">
+              <a:schemeClr val="accent1"/>
+            </a:fillRef>
+            <a:effectRef idx="1">
+              <a:schemeClr val="accent1"/>
+            </a:effectRef>
+            <a:fontRef idx="minor">
+              <a:schemeClr val="tx1"/>
+            </a:fontRef>
+          </p:style>
+        </p:cxnSp>
+        <p:sp>
+          <p:nvSpPr>
+            <p:cNvPr id="25" name="ZoneTexte 24">
+              <a:extLst>
+                <a:ext uri="{FF2B5EF4-FFF2-40B4-BE49-F238E27FC236}">
+                  <a16:creationId xmlns:a16="http://schemas.microsoft.com/office/drawing/2014/main" id="{2B326101-3CF3-4F29-3FC5-2AE603692D6B}"/>
+                </a:ext>
+              </a:extLst>
+            </p:cNvPr>
+            <p:cNvSpPr txBox="1"/>
+            <p:nvPr/>
+          </p:nvSpPr>
+          <p:spPr>
+            <a:xfrm>
+              <a:off x="2943492" y="4512991"/>
+              <a:ext cx="2504941" cy="307777"/>
+            </a:xfrm>
+            <a:prstGeom prst="rect">
+              <a:avLst/>
+            </a:prstGeom>
+            <a:noFill/>
+          </p:spPr>
+          <p:txBody>
+            <a:bodyPr wrap="square" rtlCol="0">
+              <a:spAutoFit/>
+            </a:bodyPr>
+            <a:lstStyle/>
+            <a:p>
+              <a:r>
+                <a:rPr lang="fr-FR" sz="1400" dirty="0">
+                  <a:solidFill>
+                    <a:schemeClr val="bg1"/>
+                  </a:solidFill>
+                </a:rPr>
+                <a:t>Algorithme d’</a:t>
+              </a:r>
+              <a:r>
+                <a:rPr lang="fr-FR" sz="1400" dirty="0" err="1">
+                  <a:solidFill>
+                    <a:schemeClr val="bg1"/>
+                  </a:solidFill>
+                </a:rPr>
+                <a:t>encryption</a:t>
+              </a:r>
+              <a:endParaRPr lang="fr-FR" sz="1400" dirty="0">
+                <a:solidFill>
+                  <a:srgbClr val="FFFF00"/>
+                </a:solidFill>
+              </a:endParaRPr>
+            </a:p>
+          </p:txBody>
+        </p:sp>
+        <p:sp>
+          <p:nvSpPr>
+            <p:cNvPr id="30" name="ZoneTexte 29">
+              <a:extLst>
+                <a:ext uri="{FF2B5EF4-FFF2-40B4-BE49-F238E27FC236}">
+                  <a16:creationId xmlns:a16="http://schemas.microsoft.com/office/drawing/2014/main" id="{14690856-550A-5CFB-D44E-2119AB68D71C}"/>
+                </a:ext>
+              </a:extLst>
+            </p:cNvPr>
+            <p:cNvSpPr txBox="1"/>
+            <p:nvPr/>
+          </p:nvSpPr>
+          <p:spPr>
+            <a:xfrm>
+              <a:off x="5004557" y="4512991"/>
+              <a:ext cx="587672" cy="646331"/>
+            </a:xfrm>
+            <a:prstGeom prst="rect">
+              <a:avLst/>
+            </a:prstGeom>
+            <a:solidFill>
+              <a:schemeClr val="tx1">
+                <a:lumMod val="50000"/>
+                <a:lumOff val="50000"/>
+              </a:schemeClr>
+            </a:solidFill>
+          </p:spPr>
+          <p:txBody>
+            <a:bodyPr wrap="square" rtlCol="0">
+              <a:spAutoFit/>
+            </a:bodyPr>
+            <a:lstStyle/>
+            <a:p>
+              <a:r>
+                <a:rPr lang="fr-FR" sz="1200" dirty="0">
+                  <a:solidFill>
+                    <a:schemeClr val="bg1"/>
+                  </a:solidFill>
+                </a:rPr>
+                <a:t>S%d5&amp;é###1FF</a:t>
+              </a:r>
+            </a:p>
+          </p:txBody>
+        </p:sp>
+        <p:sp>
+          <p:nvSpPr>
+            <p:cNvPr id="34" name="ZoneTexte 33">
+              <a:extLst>
+                <a:ext uri="{FF2B5EF4-FFF2-40B4-BE49-F238E27FC236}">
+                  <a16:creationId xmlns:a16="http://schemas.microsoft.com/office/drawing/2014/main" id="{3D3F8A1C-9AEE-DC02-BC47-02FDF3025C3C}"/>
+                </a:ext>
+              </a:extLst>
+            </p:cNvPr>
+            <p:cNvSpPr txBox="1"/>
+            <p:nvPr/>
+          </p:nvSpPr>
+          <p:spPr>
+            <a:xfrm>
+              <a:off x="4300950" y="4004783"/>
+              <a:ext cx="2015364" cy="523220"/>
+            </a:xfrm>
+            <a:prstGeom prst="rect">
+              <a:avLst/>
+            </a:prstGeom>
+            <a:noFill/>
+          </p:spPr>
+          <p:txBody>
+            <a:bodyPr wrap="square" rtlCol="0">
+              <a:spAutoFit/>
+            </a:bodyPr>
+            <a:lstStyle/>
+            <a:p>
+              <a:pPr algn="ctr"/>
+              <a:r>
+                <a:rPr lang="fr-FR" sz="1400" dirty="0">
+                  <a:solidFill>
+                    <a:schemeClr val="bg1"/>
+                  </a:solidFill>
+                </a:rPr>
+                <a:t>Signature numérique encrypté</a:t>
+              </a:r>
+              <a:endParaRPr lang="fr-FR" sz="1400" dirty="0">
+                <a:solidFill>
+                  <a:srgbClr val="FFFF00"/>
+                </a:solidFill>
+              </a:endParaRPr>
+            </a:p>
+          </p:txBody>
+        </p:sp>
+      </p:grpSp>
+      <p:grpSp>
+        <p:nvGrpSpPr>
+          <p:cNvPr id="53" name="Groupe 52">
             <a:extLst>
               <a:ext uri="{FF2B5EF4-FFF2-40B4-BE49-F238E27FC236}">
-                <a16:creationId xmlns:a16="http://schemas.microsoft.com/office/drawing/2014/main" id="{2B326101-3CF3-4F29-3FC5-2AE603692D6B}"/>
+                <a16:creationId xmlns:a16="http://schemas.microsoft.com/office/drawing/2014/main" id="{12366C47-46F7-C792-710E-0B850475B49F}"/>
               </a:ext>
             </a:extLst>
           </p:cNvPr>
-          <p:cNvSpPr txBox="1"/>
+          <p:cNvGrpSpPr/>
           <p:nvPr/>
-        </p:nvSpPr>
-        <p:spPr>
+        </p:nvGrpSpPr>
+        <p:grpSpPr>
           <a:xfrm>
-            <a:off x="2268895" y="3978678"/>
-            <a:ext cx="2504941" cy="307777"/>
+            <a:off x="5630367" y="4265185"/>
+            <a:ext cx="3363843" cy="646331"/>
+            <a:chOff x="5630367" y="4265185"/>
+            <a:chExt cx="3363843" cy="646331"/>
           </a:xfrm>
-          <a:prstGeom prst="rect">
-            <a:avLst/>
-          </a:prstGeom>
-          <a:noFill/>
-        </p:spPr>
-        <p:txBody>
-          <a:bodyPr wrap="square" rtlCol="0">
-            <a:spAutoFit/>
-          </a:bodyPr>
-          <a:lstStyle/>
-          <a:p>
-            <a:r>
-              <a:rPr lang="fr-FR" sz="1400" dirty="0">
-                <a:solidFill>
-                  <a:schemeClr val="bg1"/>
-                </a:solidFill>
-              </a:rPr>
-              <a:t>Algorithme d’</a:t>
-            </a:r>
-            <a:r>
-              <a:rPr lang="fr-FR" sz="1400" dirty="0" err="1">
-                <a:solidFill>
-                  <a:schemeClr val="bg1"/>
-                </a:solidFill>
-              </a:rPr>
-              <a:t>encryption</a:t>
-            </a:r>
-            <a:endParaRPr lang="fr-FR" sz="1400" dirty="0">
-              <a:solidFill>
-                <a:srgbClr val="FFFF00"/>
-              </a:solidFill>
-            </a:endParaRPr>
-          </a:p>
-        </p:txBody>
-      </p:sp>
-      <p:sp>
-        <p:nvSpPr>
-          <p:cNvPr id="30" name="ZoneTexte 29">
+        </p:grpSpPr>
+        <p:cxnSp>
+          <p:nvCxnSpPr>
+            <p:cNvPr id="31" name="Connecteur droit avec flèche 30">
+              <a:extLst>
+                <a:ext uri="{FF2B5EF4-FFF2-40B4-BE49-F238E27FC236}">
+                  <a16:creationId xmlns:a16="http://schemas.microsoft.com/office/drawing/2014/main" id="{C715CC4D-B76A-EB18-6402-99CE3F4874E4}"/>
+                </a:ext>
+              </a:extLst>
+            </p:cNvPr>
+            <p:cNvCxnSpPr>
+              <a:cxnSpLocks/>
+            </p:cNvCxnSpPr>
+            <p:nvPr/>
+          </p:nvCxnSpPr>
+          <p:spPr>
+            <a:xfrm>
+              <a:off x="5630367" y="4615398"/>
+              <a:ext cx="2776171" cy="0"/>
+            </a:xfrm>
+            <a:prstGeom prst="straightConnector1">
+              <a:avLst/>
+            </a:prstGeom>
+            <a:ln>
+              <a:tailEnd type="triangle"/>
+            </a:ln>
+          </p:spPr>
+          <p:style>
+            <a:lnRef idx="2">
+              <a:schemeClr val="accent1"/>
+            </a:lnRef>
+            <a:fillRef idx="0">
+              <a:schemeClr val="accent1"/>
+            </a:fillRef>
+            <a:effectRef idx="1">
+              <a:schemeClr val="accent1"/>
+            </a:effectRef>
+            <a:fontRef idx="minor">
+              <a:schemeClr val="tx1"/>
+            </a:fontRef>
+          </p:style>
+        </p:cxnSp>
+        <p:sp>
+          <p:nvSpPr>
+            <p:cNvPr id="51" name="ZoneTexte 50">
+              <a:extLst>
+                <a:ext uri="{FF2B5EF4-FFF2-40B4-BE49-F238E27FC236}">
+                  <a16:creationId xmlns:a16="http://schemas.microsoft.com/office/drawing/2014/main" id="{12536FDF-4F2A-CD88-1C1B-1D245D840633}"/>
+                </a:ext>
+              </a:extLst>
+            </p:cNvPr>
+            <p:cNvSpPr txBox="1"/>
+            <p:nvPr/>
+          </p:nvSpPr>
+          <p:spPr>
+            <a:xfrm>
+              <a:off x="8406538" y="4265185"/>
+              <a:ext cx="587672" cy="646331"/>
+            </a:xfrm>
+            <a:prstGeom prst="rect">
+              <a:avLst/>
+            </a:prstGeom>
+            <a:solidFill>
+              <a:schemeClr val="tx1">
+                <a:lumMod val="50000"/>
+                <a:lumOff val="50000"/>
+              </a:schemeClr>
+            </a:solidFill>
+          </p:spPr>
+          <p:txBody>
+            <a:bodyPr wrap="square" rtlCol="0">
+              <a:spAutoFit/>
+            </a:bodyPr>
+            <a:lstStyle/>
+            <a:p>
+              <a:r>
+                <a:rPr lang="fr-FR" sz="1200" dirty="0">
+                  <a:solidFill>
+                    <a:schemeClr val="bg1"/>
+                  </a:solidFill>
+                </a:rPr>
+                <a:t>S%d5&amp;é###1FF</a:t>
+              </a:r>
+            </a:p>
+          </p:txBody>
+        </p:sp>
+      </p:grpSp>
+      <p:grpSp>
+        <p:nvGrpSpPr>
+          <p:cNvPr id="54" name="Groupe 53">
             <a:extLst>
               <a:ext uri="{FF2B5EF4-FFF2-40B4-BE49-F238E27FC236}">
-                <a16:creationId xmlns:a16="http://schemas.microsoft.com/office/drawing/2014/main" id="{14690856-550A-5CFB-D44E-2119AB68D71C}"/>
+                <a16:creationId xmlns:a16="http://schemas.microsoft.com/office/drawing/2014/main" id="{C68B6611-BE8A-E2AC-E9A4-DC510CEA2537}"/>
               </a:ext>
             </a:extLst>
           </p:cNvPr>
-          <p:cNvSpPr txBox="1"/>
+          <p:cNvGrpSpPr/>
           <p:nvPr/>
-        </p:nvSpPr>
-        <p:spPr>
+        </p:nvGrpSpPr>
+        <p:grpSpPr>
           <a:xfrm>
-            <a:off x="4329960" y="3978678"/>
-            <a:ext cx="587672" cy="646331"/>
+            <a:off x="8203025" y="4735142"/>
+            <a:ext cx="2167616" cy="833069"/>
+            <a:chOff x="8203025" y="4735142"/>
+            <a:chExt cx="2167616" cy="833069"/>
           </a:xfrm>
-          <a:prstGeom prst="rect">
-            <a:avLst/>
-          </a:prstGeom>
-          <a:solidFill>
-            <a:schemeClr val="tx1">
-              <a:lumMod val="50000"/>
-              <a:lumOff val="50000"/>
-            </a:schemeClr>
-          </a:solidFill>
-        </p:spPr>
-        <p:txBody>
-          <a:bodyPr wrap="square" rtlCol="0">
-            <a:spAutoFit/>
-          </a:bodyPr>
-          <a:lstStyle/>
-          <a:p>
-            <a:r>
-              <a:rPr lang="fr-FR" sz="1200" dirty="0">
-                <a:solidFill>
-                  <a:schemeClr val="bg1"/>
-                </a:solidFill>
-              </a:rPr>
-              <a:t>S%d5&amp;é###1FF</a:t>
-            </a:r>
-          </a:p>
-        </p:txBody>
-      </p:sp>
-      <p:cxnSp>
-        <p:nvCxnSpPr>
-          <p:cNvPr id="31" name="Connecteur droit avec flèche 30">
+        </p:grpSpPr>
+        <p:grpSp>
+          <p:nvGrpSpPr>
+            <p:cNvPr id="16" name="Groupe 15">
+              <a:extLst>
+                <a:ext uri="{FF2B5EF4-FFF2-40B4-BE49-F238E27FC236}">
+                  <a16:creationId xmlns:a16="http://schemas.microsoft.com/office/drawing/2014/main" id="{7356E388-F405-94A7-C447-47B820D4ED19}"/>
+                </a:ext>
+              </a:extLst>
+            </p:cNvPr>
+            <p:cNvGrpSpPr/>
+            <p:nvPr/>
+          </p:nvGrpSpPr>
+          <p:grpSpPr>
+            <a:xfrm>
+              <a:off x="9397421" y="4820769"/>
+              <a:ext cx="973220" cy="576006"/>
+              <a:chOff x="7516494" y="2796995"/>
+              <a:chExt cx="1347805" cy="919746"/>
+            </a:xfrm>
+          </p:grpSpPr>
+          <p:pic>
+            <p:nvPicPr>
+              <p:cNvPr id="46" name="Picture 8" descr="Symbole clé (icône png) rouge">
+                <a:extLst>
+                  <a:ext uri="{FF2B5EF4-FFF2-40B4-BE49-F238E27FC236}">
+                    <a16:creationId xmlns:a16="http://schemas.microsoft.com/office/drawing/2014/main" id="{1C184A75-2D68-6D85-0B15-A937FC524664}"/>
+                  </a:ext>
+                </a:extLst>
+              </p:cNvPr>
+              <p:cNvPicPr>
+                <a:picLocks noChangeAspect="1" noChangeArrowheads="1"/>
+              </p:cNvPicPr>
+              <p:nvPr/>
+            </p:nvPicPr>
+            <p:blipFill>
+              <a:blip r:embed="rId8">
+                <a:clrChange>
+                  <a:clrFrom>
+                    <a:srgbClr val="FFFFFF"/>
+                  </a:clrFrom>
+                  <a:clrTo>
+                    <a:srgbClr val="FFFFFF">
+                      <a:alpha val="0"/>
+                    </a:srgbClr>
+                  </a:clrTo>
+                </a:clrChange>
+                <a:duotone>
+                  <a:schemeClr val="accent3">
+                    <a:shade val="45000"/>
+                    <a:satMod val="135000"/>
+                  </a:schemeClr>
+                  <a:prstClr val="white"/>
+                </a:duotone>
+                <a:extLst>
+                  <a:ext uri="{28A0092B-C50C-407E-A947-70E740481C1C}">
+                    <a14:useLocalDpi xmlns:a14="http://schemas.microsoft.com/office/drawing/2010/main" val="0"/>
+                  </a:ext>
+                </a:extLst>
+              </a:blip>
+              <a:srcRect/>
+              <a:stretch>
+                <a:fillRect/>
+              </a:stretch>
+            </p:blipFill>
+            <p:spPr bwMode="auto">
+              <a:xfrm>
+                <a:off x="7574701" y="2796995"/>
+                <a:ext cx="606978" cy="606978"/>
+              </a:xfrm>
+              <a:prstGeom prst="rect">
+                <a:avLst/>
+              </a:prstGeom>
+              <a:noFill/>
+              <a:extLst>
+                <a:ext uri="{909E8E84-426E-40DD-AFC4-6F175D3DCCD1}">
+                  <a14:hiddenFill xmlns:a14="http://schemas.microsoft.com/office/drawing/2010/main">
+                    <a:solidFill>
+                      <a:srgbClr val="FFFFFF"/>
+                    </a:solidFill>
+                  </a14:hiddenFill>
+                </a:ext>
+              </a:extLst>
+            </p:spPr>
+          </p:pic>
+          <p:sp>
+            <p:nvSpPr>
+              <p:cNvPr id="47" name="ZoneTexte 46">
+                <a:extLst>
+                  <a:ext uri="{FF2B5EF4-FFF2-40B4-BE49-F238E27FC236}">
+                    <a16:creationId xmlns:a16="http://schemas.microsoft.com/office/drawing/2014/main" id="{3007BFFD-71BE-5E80-9CBD-46D38FFD3F8E}"/>
+                  </a:ext>
+                </a:extLst>
+              </p:cNvPr>
+              <p:cNvSpPr txBox="1"/>
+              <p:nvPr/>
+            </p:nvSpPr>
+            <p:spPr>
+              <a:xfrm>
+                <a:off x="7516494" y="3176150"/>
+                <a:ext cx="1347805" cy="540591"/>
+              </a:xfrm>
+              <a:prstGeom prst="rect">
+                <a:avLst/>
+              </a:prstGeom>
+              <a:noFill/>
+            </p:spPr>
+            <p:txBody>
+              <a:bodyPr wrap="square" rtlCol="0">
+                <a:spAutoFit/>
+              </a:bodyPr>
+              <a:lstStyle/>
+              <a:p>
+                <a:r>
+                  <a:rPr lang="fr-FR" sz="1600" dirty="0">
+                    <a:solidFill>
+                      <a:schemeClr val="accent6">
+                        <a:lumMod val="60000"/>
+                        <a:lumOff val="40000"/>
+                      </a:schemeClr>
+                    </a:solidFill>
+                  </a:rPr>
+                  <a:t>pub</a:t>
+                </a:r>
+              </a:p>
+            </p:txBody>
+          </p:sp>
+        </p:grpSp>
+        <p:cxnSp>
+          <p:nvCxnSpPr>
+            <p:cNvPr id="36" name="Connecteur : en angle 35">
+              <a:extLst>
+                <a:ext uri="{FF2B5EF4-FFF2-40B4-BE49-F238E27FC236}">
+                  <a16:creationId xmlns:a16="http://schemas.microsoft.com/office/drawing/2014/main" id="{20FE4FEF-3F2E-95F8-DE30-FB730517D68A}"/>
+                </a:ext>
+              </a:extLst>
+            </p:cNvPr>
+            <p:cNvCxnSpPr>
+              <a:cxnSpLocks/>
+            </p:cNvCxnSpPr>
+            <p:nvPr/>
+          </p:nvCxnSpPr>
+          <p:spPr>
+            <a:xfrm rot="10800000">
+              <a:off x="8751008" y="4940921"/>
+              <a:ext cx="587752" cy="334587"/>
+            </a:xfrm>
+            <a:prstGeom prst="bentConnector3">
+              <a:avLst>
+                <a:gd name="adj1" fmla="val 98895"/>
+              </a:avLst>
+            </a:prstGeom>
+            <a:ln>
+              <a:tailEnd type="triangle"/>
+            </a:ln>
+          </p:spPr>
+          <p:style>
+            <a:lnRef idx="2">
+              <a:schemeClr val="accent1"/>
+            </a:lnRef>
+            <a:fillRef idx="0">
+              <a:schemeClr val="accent1"/>
+            </a:fillRef>
+            <a:effectRef idx="1">
+              <a:schemeClr val="accent1"/>
+            </a:effectRef>
+            <a:fontRef idx="minor">
+              <a:schemeClr val="tx1"/>
+            </a:fontRef>
+          </p:style>
+        </p:cxnSp>
+        <p:sp>
+          <p:nvSpPr>
+            <p:cNvPr id="49" name="ZoneTexte 48">
+              <a:extLst>
+                <a:ext uri="{FF2B5EF4-FFF2-40B4-BE49-F238E27FC236}">
+                  <a16:creationId xmlns:a16="http://schemas.microsoft.com/office/drawing/2014/main" id="{5F8D0861-77B7-2B3D-35C9-CEC8FFAD5EEC}"/>
+                </a:ext>
+              </a:extLst>
+            </p:cNvPr>
+            <p:cNvSpPr txBox="1"/>
+            <p:nvPr/>
+          </p:nvSpPr>
+          <p:spPr>
+            <a:xfrm>
+              <a:off x="8516622" y="5260434"/>
+              <a:ext cx="1228797" cy="307777"/>
+            </a:xfrm>
+            <a:prstGeom prst="rect">
+              <a:avLst/>
+            </a:prstGeom>
+            <a:noFill/>
+          </p:spPr>
+          <p:txBody>
+            <a:bodyPr wrap="square" rtlCol="0">
+              <a:spAutoFit/>
+            </a:bodyPr>
+            <a:lstStyle/>
+            <a:p>
+              <a:pPr algn="ctr"/>
+              <a:r>
+                <a:rPr lang="fr-FR" sz="1400" dirty="0">
+                  <a:solidFill>
+                    <a:schemeClr val="bg1"/>
+                  </a:solidFill>
+                </a:rPr>
+                <a:t>Vérification</a:t>
+              </a:r>
+              <a:endParaRPr lang="fr-FR" sz="1400" dirty="0">
+                <a:solidFill>
+                  <a:srgbClr val="FFFF00"/>
+                </a:solidFill>
+              </a:endParaRPr>
+            </a:p>
+          </p:txBody>
+        </p:sp>
+        <p:pic>
+          <p:nvPicPr>
+            <p:cNvPr id="4100" name="Picture 4" descr="Ok - Téléchargement icônes gratuites">
+              <a:extLst>
+                <a:ext uri="{FF2B5EF4-FFF2-40B4-BE49-F238E27FC236}">
+                  <a16:creationId xmlns:a16="http://schemas.microsoft.com/office/drawing/2014/main" id="{301CDC56-A863-87FA-A468-A1B9E5124569}"/>
+                </a:ext>
+              </a:extLst>
+            </p:cNvPr>
+            <p:cNvPicPr>
+              <a:picLocks noChangeAspect="1" noChangeArrowheads="1"/>
+            </p:cNvPicPr>
+            <p:nvPr/>
+          </p:nvPicPr>
+          <p:blipFill>
+            <a:blip r:embed="rId12">
+              <a:extLst>
+                <a:ext uri="{28A0092B-C50C-407E-A947-70E740481C1C}">
+                  <a14:useLocalDpi xmlns:a14="http://schemas.microsoft.com/office/drawing/2010/main" val="0"/>
+                </a:ext>
+              </a:extLst>
+            </a:blip>
+            <a:srcRect/>
+            <a:stretch>
+              <a:fillRect/>
+            </a:stretch>
+          </p:blipFill>
+          <p:spPr bwMode="auto">
+            <a:xfrm>
+              <a:off x="8203025" y="4735142"/>
+              <a:ext cx="460940" cy="460940"/>
+            </a:xfrm>
+            <a:prstGeom prst="rect">
+              <a:avLst/>
+            </a:prstGeom>
+            <a:noFill/>
             <a:extLst>
-              <a:ext uri="{FF2B5EF4-FFF2-40B4-BE49-F238E27FC236}">
-                <a16:creationId xmlns:a16="http://schemas.microsoft.com/office/drawing/2014/main" id="{C715CC4D-B76A-EB18-6402-99CE3F4874E4}"/>
+              <a:ext uri="{909E8E84-426E-40DD-AFC4-6F175D3DCCD1}">
+                <a14:hiddenFill xmlns:a14="http://schemas.microsoft.com/office/drawing/2010/main">
+                  <a:solidFill>
+                    <a:srgbClr val="FFFFFF"/>
+                  </a:solidFill>
+                </a14:hiddenFill>
               </a:ext>
             </a:extLst>
-          </p:cNvPr>
-          <p:cNvCxnSpPr>
-            <a:cxnSpLocks/>
-          </p:cNvCxnSpPr>
-          <p:nvPr/>
-        </p:nvCxnSpPr>
-        <p:spPr>
-          <a:xfrm>
-            <a:off x="4955770" y="4081085"/>
-            <a:ext cx="2776171" cy="0"/>
-          </a:xfrm>
-          <a:prstGeom prst="straightConnector1">
-            <a:avLst/>
-          </a:prstGeom>
-          <a:ln>
-            <a:tailEnd type="triangle"/>
-          </a:ln>
-        </p:spPr>
-        <p:style>
-          <a:lnRef idx="2">
-            <a:schemeClr val="accent1"/>
-          </a:lnRef>
-          <a:fillRef idx="0">
-            <a:schemeClr val="accent1"/>
-          </a:fillRef>
-          <a:effectRef idx="1">
-            <a:schemeClr val="accent1"/>
-          </a:effectRef>
-          <a:fontRef idx="minor">
-            <a:schemeClr val="tx1"/>
-          </a:fontRef>
-        </p:style>
-      </p:cxnSp>
-      <p:sp>
-        <p:nvSpPr>
-          <p:cNvPr id="34" name="ZoneTexte 33">
-            <a:extLst>
-              <a:ext uri="{FF2B5EF4-FFF2-40B4-BE49-F238E27FC236}">
-                <a16:creationId xmlns:a16="http://schemas.microsoft.com/office/drawing/2014/main" id="{3D3F8A1C-9AEE-DC02-BC47-02FDF3025C3C}"/>
-              </a:ext>
-            </a:extLst>
-          </p:cNvPr>
-          <p:cNvSpPr txBox="1"/>
-          <p:nvPr/>
-        </p:nvSpPr>
-        <p:spPr>
-          <a:xfrm>
-            <a:off x="3626353" y="3470470"/>
-            <a:ext cx="2015364" cy="523220"/>
-          </a:xfrm>
-          <a:prstGeom prst="rect">
-            <a:avLst/>
-          </a:prstGeom>
-          <a:noFill/>
-        </p:spPr>
-        <p:txBody>
-          <a:bodyPr wrap="square" rtlCol="0">
-            <a:spAutoFit/>
-          </a:bodyPr>
-          <a:lstStyle/>
-          <a:p>
-            <a:pPr algn="ctr"/>
-            <a:r>
-              <a:rPr lang="fr-FR" sz="1400" dirty="0">
-                <a:solidFill>
-                  <a:schemeClr val="bg1"/>
-                </a:solidFill>
-              </a:rPr>
-              <a:t>Signature numérique encrypté</a:t>
-            </a:r>
-            <a:endParaRPr lang="fr-FR" sz="1400" dirty="0">
-              <a:solidFill>
-                <a:srgbClr val="FFFF00"/>
-              </a:solidFill>
-            </a:endParaRPr>
-          </a:p>
-        </p:txBody>
-      </p:sp>
-      <p:cxnSp>
-        <p:nvCxnSpPr>
-          <p:cNvPr id="36" name="Connecteur : en angle 35">
-            <a:extLst>
-              <a:ext uri="{FF2B5EF4-FFF2-40B4-BE49-F238E27FC236}">
-                <a16:creationId xmlns:a16="http://schemas.microsoft.com/office/drawing/2014/main" id="{20FE4FEF-3F2E-95F8-DE30-FB730517D68A}"/>
-              </a:ext>
-            </a:extLst>
-          </p:cNvPr>
-          <p:cNvCxnSpPr>
-            <a:cxnSpLocks/>
-          </p:cNvCxnSpPr>
-          <p:nvPr/>
-        </p:nvCxnSpPr>
-        <p:spPr>
-          <a:xfrm rot="10800000">
-            <a:off x="8076411" y="4406608"/>
-            <a:ext cx="587752" cy="334587"/>
-          </a:xfrm>
-          <a:prstGeom prst="bentConnector3">
-            <a:avLst>
-              <a:gd name="adj1" fmla="val 98895"/>
-            </a:avLst>
-          </a:prstGeom>
-          <a:ln>
-            <a:tailEnd type="triangle"/>
-          </a:ln>
-        </p:spPr>
-        <p:style>
-          <a:lnRef idx="2">
-            <a:schemeClr val="accent1"/>
-          </a:lnRef>
-          <a:fillRef idx="0">
-            <a:schemeClr val="accent1"/>
-          </a:fillRef>
-          <a:effectRef idx="1">
-            <a:schemeClr val="accent1"/>
-          </a:effectRef>
-          <a:fontRef idx="minor">
-            <a:schemeClr val="tx1"/>
-          </a:fontRef>
-        </p:style>
-      </p:cxnSp>
-      <p:sp>
-        <p:nvSpPr>
-          <p:cNvPr id="49" name="ZoneTexte 48">
-            <a:extLst>
-              <a:ext uri="{FF2B5EF4-FFF2-40B4-BE49-F238E27FC236}">
-                <a16:creationId xmlns:a16="http://schemas.microsoft.com/office/drawing/2014/main" id="{5F8D0861-77B7-2B3D-35C9-CEC8FFAD5EEC}"/>
-              </a:ext>
-            </a:extLst>
-          </p:cNvPr>
-          <p:cNvSpPr txBox="1"/>
-          <p:nvPr/>
-        </p:nvSpPr>
-        <p:spPr>
-          <a:xfrm>
-            <a:off x="7842025" y="4726121"/>
-            <a:ext cx="1228797" cy="307777"/>
-          </a:xfrm>
-          <a:prstGeom prst="rect">
-            <a:avLst/>
-          </a:prstGeom>
-          <a:noFill/>
-        </p:spPr>
-        <p:txBody>
-          <a:bodyPr wrap="square" rtlCol="0">
-            <a:spAutoFit/>
-          </a:bodyPr>
-          <a:lstStyle/>
-          <a:p>
-            <a:pPr algn="ctr"/>
-            <a:r>
-              <a:rPr lang="fr-FR" sz="1400" dirty="0">
-                <a:solidFill>
-                  <a:schemeClr val="bg1"/>
-                </a:solidFill>
-              </a:rPr>
-              <a:t>Vérification</a:t>
-            </a:r>
-            <a:endParaRPr lang="fr-FR" sz="1400" dirty="0">
-              <a:solidFill>
-                <a:srgbClr val="FFFF00"/>
-              </a:solidFill>
-            </a:endParaRPr>
-          </a:p>
-        </p:txBody>
-      </p:sp>
-      <p:sp>
-        <p:nvSpPr>
-          <p:cNvPr id="51" name="ZoneTexte 50">
-            <a:extLst>
-              <a:ext uri="{FF2B5EF4-FFF2-40B4-BE49-F238E27FC236}">
-                <a16:creationId xmlns:a16="http://schemas.microsoft.com/office/drawing/2014/main" id="{12536FDF-4F2A-CD88-1C1B-1D245D840633}"/>
-              </a:ext>
-            </a:extLst>
-          </p:cNvPr>
-          <p:cNvSpPr txBox="1"/>
-          <p:nvPr/>
-        </p:nvSpPr>
-        <p:spPr>
-          <a:xfrm>
-            <a:off x="7731941" y="3730872"/>
-            <a:ext cx="587672" cy="646331"/>
-          </a:xfrm>
-          <a:prstGeom prst="rect">
-            <a:avLst/>
-          </a:prstGeom>
-          <a:solidFill>
-            <a:schemeClr val="tx1">
-              <a:lumMod val="50000"/>
-              <a:lumOff val="50000"/>
-            </a:schemeClr>
-          </a:solidFill>
-        </p:spPr>
-        <p:txBody>
-          <a:bodyPr wrap="square" rtlCol="0">
-            <a:spAutoFit/>
-          </a:bodyPr>
-          <a:lstStyle/>
-          <a:p>
-            <a:r>
-              <a:rPr lang="fr-FR" sz="1200" dirty="0">
-                <a:solidFill>
-                  <a:schemeClr val="bg1"/>
-                </a:solidFill>
-              </a:rPr>
-              <a:t>S%d5&amp;é###1FF</a:t>
-            </a:r>
-          </a:p>
-        </p:txBody>
-      </p:sp>
-      <p:pic>
-        <p:nvPicPr>
-          <p:cNvPr id="4100" name="Picture 4" descr="Ok - Téléchargement icônes gratuites">
-            <a:extLst>
-              <a:ext uri="{FF2B5EF4-FFF2-40B4-BE49-F238E27FC236}">
-                <a16:creationId xmlns:a16="http://schemas.microsoft.com/office/drawing/2014/main" id="{301CDC56-A863-87FA-A468-A1B9E5124569}"/>
-              </a:ext>
-            </a:extLst>
-          </p:cNvPr>
-          <p:cNvPicPr>
-            <a:picLocks noChangeAspect="1" noChangeArrowheads="1"/>
-          </p:cNvPicPr>
-          <p:nvPr/>
-        </p:nvPicPr>
-        <p:blipFill>
-          <a:blip r:embed="rId12">
-            <a:extLst>
-              <a:ext uri="{28A0092B-C50C-407E-A947-70E740481C1C}">
-                <a14:useLocalDpi xmlns:a14="http://schemas.microsoft.com/office/drawing/2010/main" val="0"/>
-              </a:ext>
-            </a:extLst>
-          </a:blip>
-          <a:srcRect/>
-          <a:stretch>
-            <a:fillRect/>
-          </a:stretch>
-        </p:blipFill>
-        <p:spPr bwMode="auto">
-          <a:xfrm>
-            <a:off x="7528428" y="4200829"/>
-            <a:ext cx="460940" cy="460940"/>
-          </a:xfrm>
-          <a:prstGeom prst="rect">
-            <a:avLst/>
-          </a:prstGeom>
-          <a:noFill/>
-          <a:extLst>
-            <a:ext uri="{909E8E84-426E-40DD-AFC4-6F175D3DCCD1}">
-              <a14:hiddenFill xmlns:a14="http://schemas.microsoft.com/office/drawing/2010/main">
-                <a:solidFill>
-                  <a:srgbClr val="FFFFFF"/>
-                </a:solidFill>
-              </a14:hiddenFill>
-            </a:ext>
-          </a:extLst>
-        </p:spPr>
-      </p:pic>
+          </p:spPr>
+        </p:pic>
+      </p:grpSp>
       <p:grpSp>
         <p:nvGrpSpPr>
           <p:cNvPr id="4103" name="Groupe 4102">
@@ -17042,10 +17302,1745 @@
           </p:style>
         </p:cxnSp>
       </p:grpSp>
+      <p:grpSp>
+        <p:nvGrpSpPr>
+          <p:cNvPr id="3" name="Groupe 2">
+            <a:extLst>
+              <a:ext uri="{FF2B5EF4-FFF2-40B4-BE49-F238E27FC236}">
+                <a16:creationId xmlns:a16="http://schemas.microsoft.com/office/drawing/2014/main" id="{C31BE932-A72B-429D-F3F3-5CDF7BE2C18E}"/>
+              </a:ext>
+            </a:extLst>
+          </p:cNvPr>
+          <p:cNvGrpSpPr/>
+          <p:nvPr/>
+        </p:nvGrpSpPr>
+        <p:grpSpPr>
+          <a:xfrm>
+            <a:off x="770040" y="3867419"/>
+            <a:ext cx="844959" cy="449222"/>
+            <a:chOff x="1637189" y="2803427"/>
+            <a:chExt cx="1347806" cy="746779"/>
+          </a:xfrm>
+        </p:grpSpPr>
+        <p:pic>
+          <p:nvPicPr>
+            <p:cNvPr id="4" name="Picture 8" descr="Symbole clé (icône png) rouge">
+              <a:extLst>
+                <a:ext uri="{FF2B5EF4-FFF2-40B4-BE49-F238E27FC236}">
+                  <a16:creationId xmlns:a16="http://schemas.microsoft.com/office/drawing/2014/main" id="{BE91FEBE-59F8-64EF-D6EE-93A678E6CFE9}"/>
+                </a:ext>
+              </a:extLst>
+            </p:cNvPr>
+            <p:cNvPicPr>
+              <a:picLocks noChangeAspect="1" noChangeArrowheads="1"/>
+            </p:cNvPicPr>
+            <p:nvPr/>
+          </p:nvPicPr>
+          <p:blipFill>
+            <a:blip r:embed="rId8">
+              <a:clrChange>
+                <a:clrFrom>
+                  <a:srgbClr val="FFFFFF"/>
+                </a:clrFrom>
+                <a:clrTo>
+                  <a:srgbClr val="FFFFFF">
+                    <a:alpha val="0"/>
+                  </a:srgbClr>
+                </a:clrTo>
+              </a:clrChange>
+              <a:extLst>
+                <a:ext uri="{28A0092B-C50C-407E-A947-70E740481C1C}">
+                  <a14:useLocalDpi xmlns:a14="http://schemas.microsoft.com/office/drawing/2010/main" val="0"/>
+                </a:ext>
+              </a:extLst>
+            </a:blip>
+            <a:srcRect/>
+            <a:stretch>
+              <a:fillRect/>
+            </a:stretch>
+          </p:blipFill>
+          <p:spPr bwMode="auto">
+            <a:xfrm>
+              <a:off x="1859433" y="2803427"/>
+              <a:ext cx="606978" cy="606978"/>
+            </a:xfrm>
+            <a:prstGeom prst="rect">
+              <a:avLst/>
+            </a:prstGeom>
+            <a:noFill/>
+            <a:extLst>
+              <a:ext uri="{909E8E84-426E-40DD-AFC4-6F175D3DCCD1}">
+                <a14:hiddenFill xmlns:a14="http://schemas.microsoft.com/office/drawing/2010/main">
+                  <a:solidFill>
+                    <a:srgbClr val="FFFFFF"/>
+                  </a:solidFill>
+                </a14:hiddenFill>
+              </a:ext>
+            </a:extLst>
+          </p:spPr>
+        </p:pic>
+        <p:sp>
+          <p:nvSpPr>
+            <p:cNvPr id="8" name="ZoneTexte 7">
+              <a:extLst>
+                <a:ext uri="{FF2B5EF4-FFF2-40B4-BE49-F238E27FC236}">
+                  <a16:creationId xmlns:a16="http://schemas.microsoft.com/office/drawing/2014/main" id="{509006B6-409A-E334-C864-F5A859F1892F}"/>
+                </a:ext>
+              </a:extLst>
+            </p:cNvPr>
+            <p:cNvSpPr txBox="1"/>
+            <p:nvPr/>
+          </p:nvSpPr>
+          <p:spPr>
+            <a:xfrm>
+              <a:off x="1637189" y="3211652"/>
+              <a:ext cx="1347806" cy="338554"/>
+            </a:xfrm>
+            <a:prstGeom prst="rect">
+              <a:avLst/>
+            </a:prstGeom>
+            <a:noFill/>
+          </p:spPr>
+          <p:txBody>
+            <a:bodyPr wrap="square" rtlCol="0">
+              <a:spAutoFit/>
+            </a:bodyPr>
+            <a:lstStyle/>
+            <a:p>
+              <a:r>
+                <a:rPr lang="fr-FR" sz="1600" dirty="0">
+                  <a:solidFill>
+                    <a:srgbClr val="FF0000"/>
+                  </a:solidFill>
+                </a:rPr>
+                <a:t>privé</a:t>
+              </a:r>
+            </a:p>
+          </p:txBody>
+        </p:sp>
+      </p:grpSp>
+      <p:grpSp>
+        <p:nvGrpSpPr>
+          <p:cNvPr id="12" name="Groupe 11">
+            <a:extLst>
+              <a:ext uri="{FF2B5EF4-FFF2-40B4-BE49-F238E27FC236}">
+                <a16:creationId xmlns:a16="http://schemas.microsoft.com/office/drawing/2014/main" id="{93DF2D73-A730-A124-AE0C-E54F12C6DDFC}"/>
+              </a:ext>
+            </a:extLst>
+          </p:cNvPr>
+          <p:cNvGrpSpPr/>
+          <p:nvPr/>
+        </p:nvGrpSpPr>
+        <p:grpSpPr>
+          <a:xfrm>
+            <a:off x="1139476" y="4470047"/>
+            <a:ext cx="844959" cy="449222"/>
+            <a:chOff x="1637189" y="2803427"/>
+            <a:chExt cx="1347806" cy="746779"/>
+          </a:xfrm>
+        </p:grpSpPr>
+        <p:pic>
+          <p:nvPicPr>
+            <p:cNvPr id="14" name="Picture 8" descr="Symbole clé (icône png) rouge">
+              <a:extLst>
+                <a:ext uri="{FF2B5EF4-FFF2-40B4-BE49-F238E27FC236}">
+                  <a16:creationId xmlns:a16="http://schemas.microsoft.com/office/drawing/2014/main" id="{5C692C1D-D2B5-1A24-DB83-24420AAE78C3}"/>
+                </a:ext>
+              </a:extLst>
+            </p:cNvPr>
+            <p:cNvPicPr>
+              <a:picLocks noChangeAspect="1" noChangeArrowheads="1"/>
+            </p:cNvPicPr>
+            <p:nvPr/>
+          </p:nvPicPr>
+          <p:blipFill>
+            <a:blip r:embed="rId8">
+              <a:clrChange>
+                <a:clrFrom>
+                  <a:srgbClr val="FFFFFF"/>
+                </a:clrFrom>
+                <a:clrTo>
+                  <a:srgbClr val="FFFFFF">
+                    <a:alpha val="0"/>
+                  </a:srgbClr>
+                </a:clrTo>
+              </a:clrChange>
+              <a:extLst>
+                <a:ext uri="{28A0092B-C50C-407E-A947-70E740481C1C}">
+                  <a14:useLocalDpi xmlns:a14="http://schemas.microsoft.com/office/drawing/2010/main" val="0"/>
+                </a:ext>
+              </a:extLst>
+            </a:blip>
+            <a:srcRect/>
+            <a:stretch>
+              <a:fillRect/>
+            </a:stretch>
+          </p:blipFill>
+          <p:spPr bwMode="auto">
+            <a:xfrm>
+              <a:off x="1859433" y="2803427"/>
+              <a:ext cx="606978" cy="606978"/>
+            </a:xfrm>
+            <a:prstGeom prst="rect">
+              <a:avLst/>
+            </a:prstGeom>
+            <a:noFill/>
+            <a:extLst>
+              <a:ext uri="{909E8E84-426E-40DD-AFC4-6F175D3DCCD1}">
+                <a14:hiddenFill xmlns:a14="http://schemas.microsoft.com/office/drawing/2010/main">
+                  <a:solidFill>
+                    <a:srgbClr val="FFFFFF"/>
+                  </a:solidFill>
+                </a14:hiddenFill>
+              </a:ext>
+            </a:extLst>
+          </p:spPr>
+        </p:pic>
+        <p:sp>
+          <p:nvSpPr>
+            <p:cNvPr id="15" name="ZoneTexte 14">
+              <a:extLst>
+                <a:ext uri="{FF2B5EF4-FFF2-40B4-BE49-F238E27FC236}">
+                  <a16:creationId xmlns:a16="http://schemas.microsoft.com/office/drawing/2014/main" id="{61468286-3442-E439-F5F0-EEC448E35CD5}"/>
+                </a:ext>
+              </a:extLst>
+            </p:cNvPr>
+            <p:cNvSpPr txBox="1"/>
+            <p:nvPr/>
+          </p:nvSpPr>
+          <p:spPr>
+            <a:xfrm>
+              <a:off x="1637189" y="3211652"/>
+              <a:ext cx="1347806" cy="338554"/>
+            </a:xfrm>
+            <a:prstGeom prst="rect">
+              <a:avLst/>
+            </a:prstGeom>
+            <a:noFill/>
+          </p:spPr>
+          <p:txBody>
+            <a:bodyPr wrap="square" rtlCol="0">
+              <a:spAutoFit/>
+            </a:bodyPr>
+            <a:lstStyle/>
+            <a:p>
+              <a:r>
+                <a:rPr lang="fr-FR" sz="1600" dirty="0">
+                  <a:solidFill>
+                    <a:srgbClr val="FF0000"/>
+                  </a:solidFill>
+                </a:rPr>
+                <a:t>privé</a:t>
+              </a:r>
+            </a:p>
+          </p:txBody>
+        </p:sp>
+      </p:grpSp>
+      <p:grpSp>
+        <p:nvGrpSpPr>
+          <p:cNvPr id="17" name="Groupe 16">
+            <a:extLst>
+              <a:ext uri="{FF2B5EF4-FFF2-40B4-BE49-F238E27FC236}">
+                <a16:creationId xmlns:a16="http://schemas.microsoft.com/office/drawing/2014/main" id="{FA6EF8D3-A253-1EDB-3997-2E433ED94391}"/>
+              </a:ext>
+            </a:extLst>
+          </p:cNvPr>
+          <p:cNvGrpSpPr/>
+          <p:nvPr/>
+        </p:nvGrpSpPr>
+        <p:grpSpPr>
+          <a:xfrm>
+            <a:off x="2511126" y="4716583"/>
+            <a:ext cx="844959" cy="830341"/>
+            <a:chOff x="1637189" y="2803427"/>
+            <a:chExt cx="1347806" cy="1380346"/>
+          </a:xfrm>
+        </p:grpSpPr>
+        <p:pic>
+          <p:nvPicPr>
+            <p:cNvPr id="20" name="Picture 8" descr="Symbole clé (icône png) rouge">
+              <a:extLst>
+                <a:ext uri="{FF2B5EF4-FFF2-40B4-BE49-F238E27FC236}">
+                  <a16:creationId xmlns:a16="http://schemas.microsoft.com/office/drawing/2014/main" id="{3AAAC1A5-03CC-9D09-F60F-77BB55DD46FB}"/>
+                </a:ext>
+              </a:extLst>
+            </p:cNvPr>
+            <p:cNvPicPr>
+              <a:picLocks noChangeAspect="1" noChangeArrowheads="1"/>
+            </p:cNvPicPr>
+            <p:nvPr/>
+          </p:nvPicPr>
+          <p:blipFill>
+            <a:blip r:embed="rId8">
+              <a:clrChange>
+                <a:clrFrom>
+                  <a:srgbClr val="FFFFFF"/>
+                </a:clrFrom>
+                <a:clrTo>
+                  <a:srgbClr val="FFFFFF">
+                    <a:alpha val="0"/>
+                  </a:srgbClr>
+                </a:clrTo>
+              </a:clrChange>
+              <a:extLst>
+                <a:ext uri="{28A0092B-C50C-407E-A947-70E740481C1C}">
+                  <a14:useLocalDpi xmlns:a14="http://schemas.microsoft.com/office/drawing/2010/main" val="0"/>
+                </a:ext>
+              </a:extLst>
+            </a:blip>
+            <a:srcRect/>
+            <a:stretch>
+              <a:fillRect/>
+            </a:stretch>
+          </p:blipFill>
+          <p:spPr bwMode="auto">
+            <a:xfrm>
+              <a:off x="1859433" y="2803427"/>
+              <a:ext cx="606978" cy="606978"/>
+            </a:xfrm>
+            <a:prstGeom prst="rect">
+              <a:avLst/>
+            </a:prstGeom>
+            <a:noFill/>
+            <a:extLst>
+              <a:ext uri="{909E8E84-426E-40DD-AFC4-6F175D3DCCD1}">
+                <a14:hiddenFill xmlns:a14="http://schemas.microsoft.com/office/drawing/2010/main">
+                  <a:solidFill>
+                    <a:srgbClr val="FFFFFF"/>
+                  </a:solidFill>
+                </a14:hiddenFill>
+              </a:ext>
+            </a:extLst>
+          </p:spPr>
+        </p:pic>
+        <p:sp>
+          <p:nvSpPr>
+            <p:cNvPr id="22" name="ZoneTexte 21">
+              <a:extLst>
+                <a:ext uri="{FF2B5EF4-FFF2-40B4-BE49-F238E27FC236}">
+                  <a16:creationId xmlns:a16="http://schemas.microsoft.com/office/drawing/2014/main" id="{A96A3E3E-D39A-2E3D-AC5F-D22B7C8355D1}"/>
+                </a:ext>
+              </a:extLst>
+            </p:cNvPr>
+            <p:cNvSpPr txBox="1"/>
+            <p:nvPr/>
+          </p:nvSpPr>
+          <p:spPr>
+            <a:xfrm>
+              <a:off x="1637189" y="3211652"/>
+              <a:ext cx="1347806" cy="972121"/>
+            </a:xfrm>
+            <a:prstGeom prst="rect">
+              <a:avLst/>
+            </a:prstGeom>
+            <a:noFill/>
+          </p:spPr>
+          <p:txBody>
+            <a:bodyPr wrap="square" rtlCol="0">
+              <a:spAutoFit/>
+            </a:bodyPr>
+            <a:lstStyle/>
+            <a:p>
+              <a:r>
+                <a:rPr lang="fr-FR" sz="1600" dirty="0">
+                  <a:solidFill>
+                    <a:srgbClr val="FF0000"/>
+                  </a:solidFill>
+                </a:rPr>
+                <a:t>Privé</a:t>
+              </a:r>
+            </a:p>
+            <a:p>
+              <a:r>
+                <a:rPr lang="fr-FR" sz="1600" dirty="0">
+                  <a:solidFill>
+                    <a:srgbClr val="FF0000"/>
+                  </a:solidFill>
+                </a:rPr>
+                <a:t>ansible</a:t>
+              </a:r>
+            </a:p>
+          </p:txBody>
+        </p:sp>
+      </p:grpSp>
+      <p:grpSp>
+        <p:nvGrpSpPr>
+          <p:cNvPr id="24" name="Groupe 23">
+            <a:extLst>
+              <a:ext uri="{FF2B5EF4-FFF2-40B4-BE49-F238E27FC236}">
+                <a16:creationId xmlns:a16="http://schemas.microsoft.com/office/drawing/2014/main" id="{75DC7A4C-4E60-39EF-FC17-6A8046B9E9DD}"/>
+              </a:ext>
+            </a:extLst>
+          </p:cNvPr>
+          <p:cNvGrpSpPr/>
+          <p:nvPr/>
+        </p:nvGrpSpPr>
+        <p:grpSpPr>
+          <a:xfrm>
+            <a:off x="626216" y="4369342"/>
+            <a:ext cx="844959" cy="449222"/>
+            <a:chOff x="1637189" y="2803427"/>
+            <a:chExt cx="1347806" cy="746779"/>
+          </a:xfrm>
+        </p:grpSpPr>
+        <p:pic>
+          <p:nvPicPr>
+            <p:cNvPr id="29" name="Picture 8" descr="Symbole clé (icône png) rouge">
+              <a:extLst>
+                <a:ext uri="{FF2B5EF4-FFF2-40B4-BE49-F238E27FC236}">
+                  <a16:creationId xmlns:a16="http://schemas.microsoft.com/office/drawing/2014/main" id="{E6AC12F7-7D92-3D4C-33B1-CC71BD608F09}"/>
+                </a:ext>
+              </a:extLst>
+            </p:cNvPr>
+            <p:cNvPicPr>
+              <a:picLocks noChangeAspect="1" noChangeArrowheads="1"/>
+            </p:cNvPicPr>
+            <p:nvPr/>
+          </p:nvPicPr>
+          <p:blipFill>
+            <a:blip r:embed="rId8">
+              <a:clrChange>
+                <a:clrFrom>
+                  <a:srgbClr val="FFFFFF"/>
+                </a:clrFrom>
+                <a:clrTo>
+                  <a:srgbClr val="FFFFFF">
+                    <a:alpha val="0"/>
+                  </a:srgbClr>
+                </a:clrTo>
+              </a:clrChange>
+              <a:extLst>
+                <a:ext uri="{28A0092B-C50C-407E-A947-70E740481C1C}">
+                  <a14:useLocalDpi xmlns:a14="http://schemas.microsoft.com/office/drawing/2010/main" val="0"/>
+                </a:ext>
+              </a:extLst>
+            </a:blip>
+            <a:srcRect/>
+            <a:stretch>
+              <a:fillRect/>
+            </a:stretch>
+          </p:blipFill>
+          <p:spPr bwMode="auto">
+            <a:xfrm>
+              <a:off x="1859433" y="2803427"/>
+              <a:ext cx="606978" cy="606978"/>
+            </a:xfrm>
+            <a:prstGeom prst="rect">
+              <a:avLst/>
+            </a:prstGeom>
+            <a:noFill/>
+            <a:extLst>
+              <a:ext uri="{909E8E84-426E-40DD-AFC4-6F175D3DCCD1}">
+                <a14:hiddenFill xmlns:a14="http://schemas.microsoft.com/office/drawing/2010/main">
+                  <a:solidFill>
+                    <a:srgbClr val="FFFFFF"/>
+                  </a:solidFill>
+                </a14:hiddenFill>
+              </a:ext>
+            </a:extLst>
+          </p:spPr>
+        </p:pic>
+        <p:sp>
+          <p:nvSpPr>
+            <p:cNvPr id="33" name="ZoneTexte 32">
+              <a:extLst>
+                <a:ext uri="{FF2B5EF4-FFF2-40B4-BE49-F238E27FC236}">
+                  <a16:creationId xmlns:a16="http://schemas.microsoft.com/office/drawing/2014/main" id="{49CED367-C58A-591E-F439-4F00AF2899DA}"/>
+                </a:ext>
+              </a:extLst>
+            </p:cNvPr>
+            <p:cNvSpPr txBox="1"/>
+            <p:nvPr/>
+          </p:nvSpPr>
+          <p:spPr>
+            <a:xfrm>
+              <a:off x="1637189" y="3211652"/>
+              <a:ext cx="1347806" cy="338554"/>
+            </a:xfrm>
+            <a:prstGeom prst="rect">
+              <a:avLst/>
+            </a:prstGeom>
+            <a:noFill/>
+          </p:spPr>
+          <p:txBody>
+            <a:bodyPr wrap="square" rtlCol="0">
+              <a:spAutoFit/>
+            </a:bodyPr>
+            <a:lstStyle/>
+            <a:p>
+              <a:r>
+                <a:rPr lang="fr-FR" sz="1600" dirty="0">
+                  <a:solidFill>
+                    <a:srgbClr val="FF0000"/>
+                  </a:solidFill>
+                </a:rPr>
+                <a:t>privé</a:t>
+              </a:r>
+            </a:p>
+          </p:txBody>
+        </p:sp>
+      </p:grpSp>
+      <p:sp>
+        <p:nvSpPr>
+          <p:cNvPr id="35" name="Ellipse 34">
+            <a:extLst>
+              <a:ext uri="{FF2B5EF4-FFF2-40B4-BE49-F238E27FC236}">
+                <a16:creationId xmlns:a16="http://schemas.microsoft.com/office/drawing/2014/main" id="{01459EE3-ABE5-39B1-7A57-23CD9A2B5429}"/>
+              </a:ext>
+            </a:extLst>
+          </p:cNvPr>
+          <p:cNvSpPr/>
+          <p:nvPr/>
+        </p:nvSpPr>
+        <p:spPr>
+          <a:xfrm>
+            <a:off x="290643" y="3617873"/>
+            <a:ext cx="1979164" cy="1550068"/>
+          </a:xfrm>
+          <a:prstGeom prst="ellipse">
+            <a:avLst/>
+          </a:prstGeom>
+          <a:noFill/>
+          <a:ln>
+            <a:solidFill>
+              <a:srgbClr val="FF0000"/>
+            </a:solidFill>
+            <a:prstDash val="lgDash"/>
+          </a:ln>
+        </p:spPr>
+        <p:style>
+          <a:lnRef idx="2">
+            <a:schemeClr val="accent1">
+              <a:shade val="15000"/>
+            </a:schemeClr>
+          </a:lnRef>
+          <a:fillRef idx="1">
+            <a:schemeClr val="accent1"/>
+          </a:fillRef>
+          <a:effectRef idx="0">
+            <a:schemeClr val="accent1"/>
+          </a:effectRef>
+          <a:fontRef idx="minor">
+            <a:schemeClr val="lt1"/>
+          </a:fontRef>
+        </p:style>
+        <p:txBody>
+          <a:bodyPr rtlCol="0" anchor="ctr"/>
+          <a:lstStyle/>
+          <a:p>
+            <a:pPr algn="ctr"/>
+            <a:endParaRPr lang="fr-FR"/>
+          </a:p>
+        </p:txBody>
+      </p:sp>
+      <p:sp>
+        <p:nvSpPr>
+          <p:cNvPr id="39" name="ZoneTexte 38">
+            <a:extLst>
+              <a:ext uri="{FF2B5EF4-FFF2-40B4-BE49-F238E27FC236}">
+                <a16:creationId xmlns:a16="http://schemas.microsoft.com/office/drawing/2014/main" id="{C3747669-6C13-486E-3D8F-6453C1E06119}"/>
+              </a:ext>
+            </a:extLst>
+          </p:cNvPr>
+          <p:cNvSpPr txBox="1"/>
+          <p:nvPr/>
+        </p:nvSpPr>
+        <p:spPr>
+          <a:xfrm>
+            <a:off x="848626" y="5165807"/>
+            <a:ext cx="1081879" cy="338554"/>
+          </a:xfrm>
+          <a:prstGeom prst="rect">
+            <a:avLst/>
+          </a:prstGeom>
+          <a:noFill/>
+        </p:spPr>
+        <p:txBody>
+          <a:bodyPr wrap="square" rtlCol="0">
+            <a:spAutoFit/>
+          </a:bodyPr>
+          <a:lstStyle/>
+          <a:p>
+            <a:r>
+              <a:rPr lang="fr-FR" sz="1600">
+                <a:solidFill>
+                  <a:schemeClr val="accent1">
+                    <a:lumMod val="20000"/>
+                    <a:lumOff val="80000"/>
+                  </a:schemeClr>
+                </a:solidFill>
+              </a:rPr>
+              <a:t>~/.ssh  </a:t>
+            </a:r>
+            <a:endParaRPr lang="fr-FR" sz="1600" dirty="0">
+              <a:solidFill>
+                <a:schemeClr val="accent1">
+                  <a:lumMod val="20000"/>
+                  <a:lumOff val="80000"/>
+                </a:schemeClr>
+              </a:solidFill>
+            </a:endParaRPr>
+          </a:p>
+        </p:txBody>
+      </p:sp>
+      <p:sp>
+        <p:nvSpPr>
+          <p:cNvPr id="42" name="ZoneTexte 41">
+            <a:extLst>
+              <a:ext uri="{FF2B5EF4-FFF2-40B4-BE49-F238E27FC236}">
+                <a16:creationId xmlns:a16="http://schemas.microsoft.com/office/drawing/2014/main" id="{0F8026A5-6393-3B15-09A3-4FA36D7F4D74}"/>
+              </a:ext>
+            </a:extLst>
+          </p:cNvPr>
+          <p:cNvSpPr txBox="1"/>
+          <p:nvPr/>
+        </p:nvSpPr>
+        <p:spPr>
+          <a:xfrm>
+            <a:off x="728430" y="1554967"/>
+            <a:ext cx="2572725" cy="461665"/>
+          </a:xfrm>
+          <a:prstGeom prst="rect">
+            <a:avLst/>
+          </a:prstGeom>
+          <a:solidFill>
+            <a:schemeClr val="tx1">
+              <a:lumMod val="75000"/>
+              <a:lumOff val="25000"/>
+            </a:schemeClr>
+          </a:solidFill>
+        </p:spPr>
+        <p:txBody>
+          <a:bodyPr wrap="square">
+            <a:spAutoFit/>
+          </a:bodyPr>
+          <a:lstStyle/>
+          <a:p>
+            <a:pPr algn="just"/>
+            <a:r>
+              <a:rPr lang="fr-FR" sz="2400" dirty="0" err="1">
+                <a:solidFill>
+                  <a:srgbClr val="00B050"/>
+                </a:solidFill>
+                <a:latin typeface="Abadi Extra Light" panose="020B0204020104020204" pitchFamily="34" charset="0"/>
+              </a:rPr>
+              <a:t>xirtam@ubuntu</a:t>
+            </a:r>
+            <a:r>
+              <a:rPr lang="fr-FR" sz="2400" dirty="0">
+                <a:solidFill>
+                  <a:srgbClr val="00B050"/>
+                </a:solidFill>
+                <a:latin typeface="Abadi Extra Light" panose="020B0204020104020204" pitchFamily="34" charset="0"/>
+              </a:rPr>
+              <a:t>:~$</a:t>
+            </a:r>
+            <a:endParaRPr lang="fr-FR" sz="2400" dirty="0">
+              <a:solidFill>
+                <a:schemeClr val="bg1"/>
+              </a:solidFill>
+              <a:latin typeface="Abadi Extra Light" panose="020B0204020104020204" pitchFamily="34" charset="0"/>
+            </a:endParaRPr>
+          </a:p>
+        </p:txBody>
+      </p:sp>
+      <p:sp>
+        <p:nvSpPr>
+          <p:cNvPr id="44" name="ZoneTexte 43">
+            <a:extLst>
+              <a:ext uri="{FF2B5EF4-FFF2-40B4-BE49-F238E27FC236}">
+                <a16:creationId xmlns:a16="http://schemas.microsoft.com/office/drawing/2014/main" id="{AA1F8798-5F9E-8ECD-9F6A-BCC54196570C}"/>
+              </a:ext>
+            </a:extLst>
+          </p:cNvPr>
+          <p:cNvSpPr txBox="1"/>
+          <p:nvPr/>
+        </p:nvSpPr>
+        <p:spPr>
+          <a:xfrm>
+            <a:off x="2456262" y="1551814"/>
+            <a:ext cx="7421474" cy="461665"/>
+          </a:xfrm>
+          <a:prstGeom prst="rect">
+            <a:avLst/>
+          </a:prstGeom>
+          <a:solidFill>
+            <a:schemeClr val="bg2">
+              <a:lumMod val="25000"/>
+            </a:schemeClr>
+          </a:solidFill>
+        </p:spPr>
+        <p:txBody>
+          <a:bodyPr wrap="square">
+            <a:spAutoFit/>
+          </a:bodyPr>
+          <a:lstStyle/>
+          <a:p>
+            <a:r>
+              <a:rPr lang="fr-FR" sz="2400" dirty="0" err="1">
+                <a:solidFill>
+                  <a:schemeClr val="bg1"/>
+                </a:solidFill>
+              </a:rPr>
+              <a:t>ssh</a:t>
+            </a:r>
+            <a:r>
+              <a:rPr lang="fr-FR" sz="2400" dirty="0">
+                <a:solidFill>
+                  <a:schemeClr val="bg1"/>
+                </a:solidFill>
+              </a:rPr>
+              <a:t> –i  ~/.</a:t>
+            </a:r>
+            <a:r>
+              <a:rPr lang="fr-FR" sz="2400" dirty="0" err="1">
+                <a:solidFill>
+                  <a:schemeClr val="bg1"/>
+                </a:solidFill>
+              </a:rPr>
+              <a:t>ssh</a:t>
+            </a:r>
+            <a:r>
+              <a:rPr lang="fr-FR" sz="2400" dirty="0">
+                <a:solidFill>
+                  <a:schemeClr val="bg1"/>
+                </a:solidFill>
+              </a:rPr>
+              <a:t>/</a:t>
+            </a:r>
+            <a:r>
+              <a:rPr lang="fr-FR" sz="2400" dirty="0">
+                <a:solidFill>
+                  <a:srgbClr val="FF0000"/>
+                </a:solidFill>
+              </a:rPr>
+              <a:t>ansible </a:t>
+            </a:r>
+            <a:r>
+              <a:rPr lang="fr-FR" sz="2400" dirty="0">
+                <a:solidFill>
+                  <a:schemeClr val="accent1">
+                    <a:lumMod val="20000"/>
+                    <a:lumOff val="80000"/>
+                  </a:schemeClr>
+                </a:solidFill>
+              </a:rPr>
+              <a:t> </a:t>
+            </a:r>
+            <a:r>
+              <a:rPr lang="fr-FR" sz="2400" dirty="0">
+                <a:solidFill>
+                  <a:schemeClr val="bg1"/>
+                </a:solidFill>
+              </a:rPr>
+              <a:t>xyz@192.168.233.133</a:t>
+            </a:r>
+          </a:p>
+        </p:txBody>
+      </p:sp>
+      <p:pic>
+        <p:nvPicPr>
+          <p:cNvPr id="1026" name="Picture 2" descr="folder&quot; Icon - Download for free – Iconduck">
+            <a:extLst>
+              <a:ext uri="{FF2B5EF4-FFF2-40B4-BE49-F238E27FC236}">
+                <a16:creationId xmlns:a16="http://schemas.microsoft.com/office/drawing/2014/main" id="{94A7535A-D743-B1C5-5B96-58993857120F}"/>
+              </a:ext>
+            </a:extLst>
+          </p:cNvPr>
+          <p:cNvPicPr>
+            <a:picLocks noChangeAspect="1" noChangeArrowheads="1"/>
+          </p:cNvPicPr>
+          <p:nvPr/>
+        </p:nvPicPr>
+        <p:blipFill>
+          <a:blip r:embed="rId14">
+            <a:extLst>
+              <a:ext uri="{28A0092B-C50C-407E-A947-70E740481C1C}">
+                <a14:useLocalDpi xmlns:a14="http://schemas.microsoft.com/office/drawing/2010/main" val="0"/>
+              </a:ext>
+            </a:extLst>
+          </a:blip>
+          <a:srcRect/>
+          <a:stretch>
+            <a:fillRect/>
+          </a:stretch>
+        </p:blipFill>
+        <p:spPr bwMode="auto">
+          <a:xfrm>
+            <a:off x="491266" y="5191807"/>
+            <a:ext cx="354876" cy="283901"/>
+          </a:xfrm>
+          <a:prstGeom prst="rect">
+            <a:avLst/>
+          </a:prstGeom>
+          <a:noFill/>
+          <a:extLst>
+            <a:ext uri="{909E8E84-426E-40DD-AFC4-6F175D3DCCD1}">
+              <a14:hiddenFill xmlns:a14="http://schemas.microsoft.com/office/drawing/2010/main">
+                <a:solidFill>
+                  <a:srgbClr val="FFFFFF"/>
+                </a:solidFill>
+              </a14:hiddenFill>
+            </a:ext>
+          </a:extLst>
+        </p:spPr>
+      </p:pic>
+      <mc:AlternateContent xmlns:mc="http://schemas.openxmlformats.org/markup-compatibility/2006">
+        <mc:Choice xmlns:p14="http://schemas.microsoft.com/office/powerpoint/2010/main" Requires="p14">
+          <p:contentPart p14:bwMode="auto" r:id="rId15">
+            <p14:nvContentPartPr>
+              <p14:cNvPr id="50" name="Encre 49">
+                <a:extLst>
+                  <a:ext uri="{FF2B5EF4-FFF2-40B4-BE49-F238E27FC236}">
+                    <a16:creationId xmlns:a16="http://schemas.microsoft.com/office/drawing/2014/main" id="{C2F0518E-7E0F-2890-32F2-8A36171D6466}"/>
+                  </a:ext>
+                </a:extLst>
+              </p14:cNvPr>
+              <p14:cNvContentPartPr/>
+              <p14:nvPr/>
+            </p14:nvContentPartPr>
+            <p14:xfrm>
+              <a:off x="1341449" y="4440675"/>
+              <a:ext cx="711000" cy="24840"/>
+            </p14:xfrm>
+          </p:contentPart>
+        </mc:Choice>
+        <mc:Fallback>
+          <p:pic>
+            <p:nvPicPr>
+              <p:cNvPr id="50" name="Encre 49">
+                <a:extLst>
+                  <a:ext uri="{FF2B5EF4-FFF2-40B4-BE49-F238E27FC236}">
+                    <a16:creationId xmlns:a16="http://schemas.microsoft.com/office/drawing/2014/main" id="{C2F0518E-7E0F-2890-32F2-8A36171D6466}"/>
+                  </a:ext>
+                </a:extLst>
+              </p:cNvPr>
+              <p:cNvPicPr/>
+              <p:nvPr/>
+            </p:nvPicPr>
+            <p:blipFill>
+              <a:blip r:embed="rId16"/>
+              <a:stretch>
+                <a:fillRect/>
+              </a:stretch>
+            </p:blipFill>
+            <p:spPr>
+              <a:xfrm>
+                <a:off x="1332809" y="4431675"/>
+                <a:ext cx="728640" cy="42480"/>
+              </a:xfrm>
+              <a:prstGeom prst="rect">
+                <a:avLst/>
+              </a:prstGeom>
+            </p:spPr>
+          </p:pic>
+        </mc:Fallback>
+      </mc:AlternateContent>
     </p:spTree>
     <p:extLst>
       <p:ext uri="{BB962C8B-B14F-4D97-AF65-F5344CB8AC3E}">
         <p14:creationId xmlns:p14="http://schemas.microsoft.com/office/powerpoint/2010/main" val="3279860199"/>
+      </p:ext>
+    </p:extLst>
+  </p:cSld>
+  <p:clrMapOvr>
+    <a:masterClrMapping/>
+  </p:clrMapOvr>
+  <p:timing>
+    <p:tnLst>
+      <p:par>
+        <p:cTn id="1" dur="indefinite" restart="never" nodeType="tmRoot">
+          <p:childTnLst>
+            <p:seq concurrent="1" nextAc="seek">
+              <p:cTn id="2" dur="indefinite" nodeType="mainSeq">
+                <p:childTnLst>
+                  <p:par>
+                    <p:cTn id="3" fill="hold">
+                      <p:stCondLst>
+                        <p:cond delay="indefinite"/>
+                      </p:stCondLst>
+                      <p:childTnLst>
+                        <p:par>
+                          <p:cTn id="4" fill="hold">
+                            <p:stCondLst>
+                              <p:cond delay="0"/>
+                            </p:stCondLst>
+                            <p:childTnLst>
+                              <p:par>
+                                <p:cTn id="5" presetID="22" presetClass="entr" presetSubtype="8" fill="hold" grpId="0" nodeType="clickEffect">
+                                  <p:stCondLst>
+                                    <p:cond delay="0"/>
+                                  </p:stCondLst>
+                                  <p:childTnLst>
+                                    <p:set>
+                                      <p:cBhvr>
+                                        <p:cTn id="6" dur="1" fill="hold">
+                                          <p:stCondLst>
+                                            <p:cond delay="0"/>
+                                          </p:stCondLst>
+                                        </p:cTn>
+                                        <p:tgtEl>
+                                          <p:spTgt spid="44"/>
+                                        </p:tgtEl>
+                                        <p:attrNameLst>
+                                          <p:attrName>style.visibility</p:attrName>
+                                        </p:attrNameLst>
+                                      </p:cBhvr>
+                                      <p:to>
+                                        <p:strVal val="visible"/>
+                                      </p:to>
+                                    </p:set>
+                                    <p:animEffect transition="in" filter="wipe(left)">
+                                      <p:cBhvr>
+                                        <p:cTn id="7" dur="500"/>
+                                        <p:tgtEl>
+                                          <p:spTgt spid="44"/>
+                                        </p:tgtEl>
+                                      </p:cBhvr>
+                                    </p:animEffect>
+                                  </p:childTnLst>
+                                </p:cTn>
+                              </p:par>
+                            </p:childTnLst>
+                          </p:cTn>
+                        </p:par>
+                      </p:childTnLst>
+                    </p:cTn>
+                  </p:par>
+                  <p:par>
+                    <p:cTn id="8" fill="hold">
+                      <p:stCondLst>
+                        <p:cond delay="indefinite"/>
+                      </p:stCondLst>
+                      <p:childTnLst>
+                        <p:par>
+                          <p:cTn id="9" fill="hold">
+                            <p:stCondLst>
+                              <p:cond delay="0"/>
+                            </p:stCondLst>
+                            <p:childTnLst>
+                              <p:par>
+                                <p:cTn id="10" presetID="22" presetClass="entr" presetSubtype="8" fill="hold" nodeType="clickEffect">
+                                  <p:stCondLst>
+                                    <p:cond delay="0"/>
+                                  </p:stCondLst>
+                                  <p:childTnLst>
+                                    <p:set>
+                                      <p:cBhvr>
+                                        <p:cTn id="11" dur="1" fill="hold">
+                                          <p:stCondLst>
+                                            <p:cond delay="0"/>
+                                          </p:stCondLst>
+                                        </p:cTn>
+                                        <p:tgtEl>
+                                          <p:spTgt spid="50"/>
+                                        </p:tgtEl>
+                                        <p:attrNameLst>
+                                          <p:attrName>style.visibility</p:attrName>
+                                        </p:attrNameLst>
+                                      </p:cBhvr>
+                                      <p:to>
+                                        <p:strVal val="visible"/>
+                                      </p:to>
+                                    </p:set>
+                                    <p:animEffect transition="in" filter="wipe(left)">
+                                      <p:cBhvr>
+                                        <p:cTn id="12" dur="500"/>
+                                        <p:tgtEl>
+                                          <p:spTgt spid="50"/>
+                                        </p:tgtEl>
+                                      </p:cBhvr>
+                                    </p:animEffect>
+                                  </p:childTnLst>
+                                </p:cTn>
+                              </p:par>
+                            </p:childTnLst>
+                          </p:cTn>
+                        </p:par>
+                        <p:par>
+                          <p:cTn id="13" fill="hold">
+                            <p:stCondLst>
+                              <p:cond delay="500"/>
+                            </p:stCondLst>
+                            <p:childTnLst>
+                              <p:par>
+                                <p:cTn id="14" presetID="22" presetClass="entr" presetSubtype="8" fill="hold" nodeType="afterEffect">
+                                  <p:stCondLst>
+                                    <p:cond delay="0"/>
+                                  </p:stCondLst>
+                                  <p:childTnLst>
+                                    <p:set>
+                                      <p:cBhvr>
+                                        <p:cTn id="15" dur="1" fill="hold">
+                                          <p:stCondLst>
+                                            <p:cond delay="0"/>
+                                          </p:stCondLst>
+                                        </p:cTn>
+                                        <p:tgtEl>
+                                          <p:spTgt spid="17"/>
+                                        </p:tgtEl>
+                                        <p:attrNameLst>
+                                          <p:attrName>style.visibility</p:attrName>
+                                        </p:attrNameLst>
+                                      </p:cBhvr>
+                                      <p:to>
+                                        <p:strVal val="visible"/>
+                                      </p:to>
+                                    </p:set>
+                                    <p:animEffect transition="in" filter="wipe(left)">
+                                      <p:cBhvr>
+                                        <p:cTn id="16" dur="500"/>
+                                        <p:tgtEl>
+                                          <p:spTgt spid="17"/>
+                                        </p:tgtEl>
+                                      </p:cBhvr>
+                                    </p:animEffect>
+                                  </p:childTnLst>
+                                </p:cTn>
+                              </p:par>
+                            </p:childTnLst>
+                          </p:cTn>
+                        </p:par>
+                      </p:childTnLst>
+                    </p:cTn>
+                  </p:par>
+                  <p:par>
+                    <p:cTn id="17" fill="hold">
+                      <p:stCondLst>
+                        <p:cond delay="indefinite"/>
+                      </p:stCondLst>
+                      <p:childTnLst>
+                        <p:par>
+                          <p:cTn id="18" fill="hold">
+                            <p:stCondLst>
+                              <p:cond delay="0"/>
+                            </p:stCondLst>
+                            <p:childTnLst>
+                              <p:par>
+                                <p:cTn id="19" presetID="22" presetClass="entr" presetSubtype="8" fill="hold" nodeType="clickEffect">
+                                  <p:stCondLst>
+                                    <p:cond delay="0"/>
+                                  </p:stCondLst>
+                                  <p:childTnLst>
+                                    <p:set>
+                                      <p:cBhvr>
+                                        <p:cTn id="20" dur="1" fill="hold">
+                                          <p:stCondLst>
+                                            <p:cond delay="0"/>
+                                          </p:stCondLst>
+                                        </p:cTn>
+                                        <p:tgtEl>
+                                          <p:spTgt spid="52"/>
+                                        </p:tgtEl>
+                                        <p:attrNameLst>
+                                          <p:attrName>style.visibility</p:attrName>
+                                        </p:attrNameLst>
+                                      </p:cBhvr>
+                                      <p:to>
+                                        <p:strVal val="visible"/>
+                                      </p:to>
+                                    </p:set>
+                                    <p:animEffect transition="in" filter="wipe(left)">
+                                      <p:cBhvr>
+                                        <p:cTn id="21" dur="500"/>
+                                        <p:tgtEl>
+                                          <p:spTgt spid="52"/>
+                                        </p:tgtEl>
+                                      </p:cBhvr>
+                                    </p:animEffect>
+                                  </p:childTnLst>
+                                </p:cTn>
+                              </p:par>
+                            </p:childTnLst>
+                          </p:cTn>
+                        </p:par>
+                      </p:childTnLst>
+                    </p:cTn>
+                  </p:par>
+                  <p:par>
+                    <p:cTn id="22" fill="hold">
+                      <p:stCondLst>
+                        <p:cond delay="indefinite"/>
+                      </p:stCondLst>
+                      <p:childTnLst>
+                        <p:par>
+                          <p:cTn id="23" fill="hold">
+                            <p:stCondLst>
+                              <p:cond delay="0"/>
+                            </p:stCondLst>
+                            <p:childTnLst>
+                              <p:par>
+                                <p:cTn id="24" presetID="22" presetClass="entr" presetSubtype="8" fill="hold" nodeType="clickEffect">
+                                  <p:stCondLst>
+                                    <p:cond delay="0"/>
+                                  </p:stCondLst>
+                                  <p:childTnLst>
+                                    <p:set>
+                                      <p:cBhvr>
+                                        <p:cTn id="25" dur="1" fill="hold">
+                                          <p:stCondLst>
+                                            <p:cond delay="0"/>
+                                          </p:stCondLst>
+                                        </p:cTn>
+                                        <p:tgtEl>
+                                          <p:spTgt spid="53"/>
+                                        </p:tgtEl>
+                                        <p:attrNameLst>
+                                          <p:attrName>style.visibility</p:attrName>
+                                        </p:attrNameLst>
+                                      </p:cBhvr>
+                                      <p:to>
+                                        <p:strVal val="visible"/>
+                                      </p:to>
+                                    </p:set>
+                                    <p:animEffect transition="in" filter="wipe(left)">
+                                      <p:cBhvr>
+                                        <p:cTn id="26" dur="500"/>
+                                        <p:tgtEl>
+                                          <p:spTgt spid="53"/>
+                                        </p:tgtEl>
+                                      </p:cBhvr>
+                                    </p:animEffect>
+                                  </p:childTnLst>
+                                </p:cTn>
+                              </p:par>
+                            </p:childTnLst>
+                          </p:cTn>
+                        </p:par>
+                      </p:childTnLst>
+                    </p:cTn>
+                  </p:par>
+                  <p:par>
+                    <p:cTn id="27" fill="hold">
+                      <p:stCondLst>
+                        <p:cond delay="indefinite"/>
+                      </p:stCondLst>
+                      <p:childTnLst>
+                        <p:par>
+                          <p:cTn id="28" fill="hold">
+                            <p:stCondLst>
+                              <p:cond delay="0"/>
+                            </p:stCondLst>
+                            <p:childTnLst>
+                              <p:par>
+                                <p:cTn id="29" presetID="22" presetClass="entr" presetSubtype="2" fill="hold" nodeType="clickEffect">
+                                  <p:stCondLst>
+                                    <p:cond delay="0"/>
+                                  </p:stCondLst>
+                                  <p:childTnLst>
+                                    <p:set>
+                                      <p:cBhvr>
+                                        <p:cTn id="30" dur="1" fill="hold">
+                                          <p:stCondLst>
+                                            <p:cond delay="0"/>
+                                          </p:stCondLst>
+                                        </p:cTn>
+                                        <p:tgtEl>
+                                          <p:spTgt spid="54"/>
+                                        </p:tgtEl>
+                                        <p:attrNameLst>
+                                          <p:attrName>style.visibility</p:attrName>
+                                        </p:attrNameLst>
+                                      </p:cBhvr>
+                                      <p:to>
+                                        <p:strVal val="visible"/>
+                                      </p:to>
+                                    </p:set>
+                                    <p:animEffect transition="in" filter="wipe(right)">
+                                      <p:cBhvr>
+                                        <p:cTn id="31" dur="500"/>
+                                        <p:tgtEl>
+                                          <p:spTgt spid="54"/>
+                                        </p:tgtEl>
+                                      </p:cBhvr>
+                                    </p:animEffect>
+                                  </p:childTnLst>
+                                </p:cTn>
+                              </p:par>
+                            </p:childTnLst>
+                          </p:cTn>
+                        </p:par>
+                      </p:childTnLst>
+                    </p:cTn>
+                  </p:par>
+                  <p:par>
+                    <p:cTn id="32" fill="hold">
+                      <p:stCondLst>
+                        <p:cond delay="indefinite"/>
+                      </p:stCondLst>
+                      <p:childTnLst>
+                        <p:par>
+                          <p:cTn id="33" fill="hold">
+                            <p:stCondLst>
+                              <p:cond delay="0"/>
+                            </p:stCondLst>
+                            <p:childTnLst>
+                              <p:par>
+                                <p:cTn id="34" presetID="22" presetClass="entr" presetSubtype="8" fill="hold" nodeType="clickEffect">
+                                  <p:stCondLst>
+                                    <p:cond delay="0"/>
+                                  </p:stCondLst>
+                                  <p:childTnLst>
+                                    <p:set>
+                                      <p:cBhvr>
+                                        <p:cTn id="35" dur="1" fill="hold">
+                                          <p:stCondLst>
+                                            <p:cond delay="0"/>
+                                          </p:stCondLst>
+                                        </p:cTn>
+                                        <p:tgtEl>
+                                          <p:spTgt spid="4103"/>
+                                        </p:tgtEl>
+                                        <p:attrNameLst>
+                                          <p:attrName>style.visibility</p:attrName>
+                                        </p:attrNameLst>
+                                      </p:cBhvr>
+                                      <p:to>
+                                        <p:strVal val="visible"/>
+                                      </p:to>
+                                    </p:set>
+                                    <p:animEffect transition="in" filter="wipe(left)">
+                                      <p:cBhvr>
+                                        <p:cTn id="36" dur="500"/>
+                                        <p:tgtEl>
+                                          <p:spTgt spid="4103"/>
+                                        </p:tgtEl>
+                                      </p:cBhvr>
+                                    </p:animEffect>
+                                  </p:childTnLst>
+                                </p:cTn>
+                              </p:par>
+                            </p:childTnLst>
+                          </p:cTn>
+                        </p:par>
+                      </p:childTnLst>
+                    </p:cTn>
+                  </p:par>
+                </p:childTnLst>
+              </p:cTn>
+              <p:prevCondLst>
+                <p:cond evt="onPrev" delay="0">
+                  <p:tgtEl>
+                    <p:sldTgt/>
+                  </p:tgtEl>
+                </p:cond>
+              </p:prevCondLst>
+              <p:nextCondLst>
+                <p:cond evt="onNext" delay="0">
+                  <p:tgtEl>
+                    <p:sldTgt/>
+                  </p:tgtEl>
+                </p:cond>
+              </p:nextCondLst>
+            </p:seq>
+          </p:childTnLst>
+        </p:cTn>
+      </p:par>
+    </p:tnLst>
+    <p:bldLst>
+      <p:bldP spid="44" grpId="0" animBg="1"/>
+    </p:bldLst>
+  </p:timing>
+</p:sld>
+</file>
+
+<file path=ppt/slides/slide14.xml><?xml version="1.0" encoding="utf-8"?>
+<p:sld xmlns:a="http://schemas.openxmlformats.org/drawingml/2006/main" xmlns:r="http://schemas.openxmlformats.org/officeDocument/2006/relationships" xmlns:p="http://schemas.openxmlformats.org/presentationml/2006/main">
+  <p:cSld>
+    <p:bg>
+      <p:bgPr>
+        <a:solidFill>
+          <a:schemeClr val="tx1"/>
+        </a:solidFill>
+        <a:effectLst/>
+      </p:bgPr>
+    </p:bg>
+    <p:spTree>
+      <p:nvGrpSpPr>
+        <p:cNvPr id="1" name=""/>
+        <p:cNvGrpSpPr/>
+        <p:nvPr/>
+      </p:nvGrpSpPr>
+      <p:grpSpPr>
+        <a:xfrm>
+          <a:off x="0" y="0"/>
+          <a:ext cx="0" cy="0"/>
+          <a:chOff x="0" y="0"/>
+          <a:chExt cx="0" cy="0"/>
+        </a:xfrm>
+      </p:grpSpPr>
+      <p:sp>
+        <p:nvSpPr>
+          <p:cNvPr id="5" name="Rectangle 4">
+            <a:extLst>
+              <a:ext uri="{FF2B5EF4-FFF2-40B4-BE49-F238E27FC236}">
+                <a16:creationId xmlns:a16="http://schemas.microsoft.com/office/drawing/2014/main" id="{A3C93801-4E41-FAA0-D55A-0FDDE0FCB4F4}"/>
+              </a:ext>
+            </a:extLst>
+          </p:cNvPr>
+          <p:cNvSpPr/>
+          <p:nvPr/>
+        </p:nvSpPr>
+        <p:spPr>
+          <a:xfrm>
+            <a:off x="121920" y="158497"/>
+            <a:ext cx="11923776" cy="794004"/>
+          </a:xfrm>
+          <a:prstGeom prst="rect">
+            <a:avLst/>
+          </a:prstGeom>
+          <a:noFill/>
+          <a:ln>
+            <a:solidFill>
+              <a:schemeClr val="tx2">
+                <a:lumMod val="25000"/>
+                <a:lumOff val="75000"/>
+              </a:schemeClr>
+            </a:solidFill>
+          </a:ln>
+        </p:spPr>
+        <p:style>
+          <a:lnRef idx="2">
+            <a:schemeClr val="accent1">
+              <a:shade val="15000"/>
+            </a:schemeClr>
+          </a:lnRef>
+          <a:fillRef idx="1">
+            <a:schemeClr val="accent1"/>
+          </a:fillRef>
+          <a:effectRef idx="0">
+            <a:schemeClr val="accent1"/>
+          </a:effectRef>
+          <a:fontRef idx="minor">
+            <a:schemeClr val="lt1"/>
+          </a:fontRef>
+        </p:style>
+        <p:txBody>
+          <a:bodyPr rtlCol="0" anchor="ctr"/>
+          <a:lstStyle/>
+          <a:p>
+            <a:pPr algn="ctr"/>
+            <a:endParaRPr lang="fr-FR"/>
+          </a:p>
+        </p:txBody>
+      </p:sp>
+      <p:sp>
+        <p:nvSpPr>
+          <p:cNvPr id="6" name="Rectangle 5">
+            <a:extLst>
+              <a:ext uri="{FF2B5EF4-FFF2-40B4-BE49-F238E27FC236}">
+                <a16:creationId xmlns:a16="http://schemas.microsoft.com/office/drawing/2014/main" id="{F7F463C6-9F15-D3A0-27D6-89A3698B4C72}"/>
+              </a:ext>
+            </a:extLst>
+          </p:cNvPr>
+          <p:cNvSpPr/>
+          <p:nvPr/>
+        </p:nvSpPr>
+        <p:spPr>
+          <a:xfrm>
+            <a:off x="121920" y="1081230"/>
+            <a:ext cx="11923776" cy="5656373"/>
+          </a:xfrm>
+          <a:prstGeom prst="rect">
+            <a:avLst/>
+          </a:prstGeom>
+          <a:noFill/>
+          <a:ln>
+            <a:solidFill>
+              <a:schemeClr val="tx2">
+                <a:lumMod val="25000"/>
+                <a:lumOff val="75000"/>
+              </a:schemeClr>
+            </a:solidFill>
+          </a:ln>
+        </p:spPr>
+        <p:style>
+          <a:lnRef idx="2">
+            <a:schemeClr val="accent1">
+              <a:shade val="15000"/>
+            </a:schemeClr>
+          </a:lnRef>
+          <a:fillRef idx="1">
+            <a:schemeClr val="accent1"/>
+          </a:fillRef>
+          <a:effectRef idx="0">
+            <a:schemeClr val="accent1"/>
+          </a:effectRef>
+          <a:fontRef idx="minor">
+            <a:schemeClr val="lt1"/>
+          </a:fontRef>
+        </p:style>
+        <p:txBody>
+          <a:bodyPr rtlCol="0" anchor="ctr"/>
+          <a:lstStyle/>
+          <a:p>
+            <a:pPr algn="ctr"/>
+            <a:endParaRPr lang="fr-FR"/>
+          </a:p>
+        </p:txBody>
+      </p:sp>
+      <p:sp>
+        <p:nvSpPr>
+          <p:cNvPr id="9" name="ZoneTexte 8">
+            <a:extLst>
+              <a:ext uri="{FF2B5EF4-FFF2-40B4-BE49-F238E27FC236}">
+                <a16:creationId xmlns:a16="http://schemas.microsoft.com/office/drawing/2014/main" id="{08638F46-9CDF-0831-70AB-2C5D03CF520D}"/>
+              </a:ext>
+            </a:extLst>
+          </p:cNvPr>
+          <p:cNvSpPr txBox="1"/>
+          <p:nvPr/>
+        </p:nvSpPr>
+        <p:spPr>
+          <a:xfrm>
+            <a:off x="698500" y="386222"/>
+            <a:ext cx="6096000" cy="400110"/>
+          </a:xfrm>
+          <a:prstGeom prst="rect">
+            <a:avLst/>
+          </a:prstGeom>
+          <a:noFill/>
+        </p:spPr>
+        <p:txBody>
+          <a:bodyPr wrap="square">
+            <a:spAutoFit/>
+          </a:bodyPr>
+          <a:lstStyle/>
+          <a:p>
+            <a:pPr>
+              <a:buClr>
+                <a:srgbClr val="FF0000"/>
+              </a:buClr>
+            </a:pPr>
+            <a:r>
+              <a:rPr lang="fr-FR" sz="2000" dirty="0">
+                <a:solidFill>
+                  <a:schemeClr val="bg1"/>
+                </a:solidFill>
+                <a:effectLst/>
+                <a:latin typeface="Arial Black" panose="020B0A04020102020204" pitchFamily="34" charset="0"/>
+                <a:ea typeface="Calibri" panose="020F0502020204030204" pitchFamily="34" charset="0"/>
+                <a:cs typeface="Calibri" panose="020F0502020204030204" pitchFamily="34" charset="0"/>
+              </a:rPr>
+              <a:t>Infrastructures Ansible : </a:t>
+            </a:r>
+            <a:r>
+              <a:rPr lang="fr-FR" sz="2000" dirty="0">
+                <a:solidFill>
+                  <a:srgbClr val="FFFF00"/>
+                </a:solidFill>
+                <a:latin typeface="Arial Black" panose="020B0A04020102020204" pitchFamily="34" charset="0"/>
+                <a:ea typeface="Calibri" panose="020F0502020204030204" pitchFamily="34" charset="0"/>
+                <a:cs typeface="Calibri" panose="020F0502020204030204" pitchFamily="34" charset="0"/>
+              </a:rPr>
+              <a:t>Ansible concept</a:t>
+            </a:r>
+            <a:endParaRPr lang="fr-FR" sz="2000" dirty="0">
+              <a:solidFill>
+                <a:schemeClr val="bg1"/>
+              </a:solidFill>
+            </a:endParaRPr>
+          </a:p>
+        </p:txBody>
+      </p:sp>
+      <p:pic>
+        <p:nvPicPr>
+          <p:cNvPr id="2" name="Image 1">
+            <a:extLst>
+              <a:ext uri="{FF2B5EF4-FFF2-40B4-BE49-F238E27FC236}">
+                <a16:creationId xmlns:a16="http://schemas.microsoft.com/office/drawing/2014/main" id="{C6977999-3267-359F-AB30-3F1D0235AA44}"/>
+              </a:ext>
+            </a:extLst>
+          </p:cNvPr>
+          <p:cNvPicPr>
+            <a:picLocks noChangeAspect="1"/>
+          </p:cNvPicPr>
+          <p:nvPr/>
+        </p:nvPicPr>
+        <p:blipFill>
+          <a:blip r:embed="rId3">
+            <a:clrChange>
+              <a:clrFrom>
+                <a:srgbClr val="000000"/>
+              </a:clrFrom>
+              <a:clrTo>
+                <a:srgbClr val="000000">
+                  <a:alpha val="0"/>
+                </a:srgbClr>
+              </a:clrTo>
+            </a:clrChange>
+          </a:blip>
+          <a:stretch>
+            <a:fillRect/>
+          </a:stretch>
+        </p:blipFill>
+        <p:spPr>
+          <a:xfrm>
+            <a:off x="10382828" y="154462"/>
+            <a:ext cx="1414521" cy="792132"/>
+          </a:xfrm>
+          <a:prstGeom prst="rect">
+            <a:avLst/>
+          </a:prstGeom>
+        </p:spPr>
+      </p:pic>
+      <mc:AlternateContent xmlns:mc="http://schemas.openxmlformats.org/markup-compatibility/2006">
+        <mc:Choice xmlns:p14="http://schemas.microsoft.com/office/powerpoint/2010/main" Requires="p14">
+          <p:contentPart p14:bwMode="auto" r:id="rId4">
+            <p14:nvContentPartPr>
+              <p14:cNvPr id="21" name="Encre 20">
+                <a:extLst>
+                  <a:ext uri="{FF2B5EF4-FFF2-40B4-BE49-F238E27FC236}">
+                    <a16:creationId xmlns:a16="http://schemas.microsoft.com/office/drawing/2014/main" id="{0FE0BAE8-1A30-4F38-6546-D1BE99A6B8A0}"/>
+                  </a:ext>
+                </a:extLst>
+              </p14:cNvPr>
+              <p14:cNvContentPartPr/>
+              <p14:nvPr/>
+            </p14:nvContentPartPr>
+            <p14:xfrm>
+              <a:off x="-1906499" y="875414"/>
+              <a:ext cx="360" cy="360"/>
+            </p14:xfrm>
+          </p:contentPart>
+        </mc:Choice>
+        <mc:Fallback>
+          <p:pic>
+            <p:nvPicPr>
+              <p:cNvPr id="21" name="Encre 20">
+                <a:extLst>
+                  <a:ext uri="{FF2B5EF4-FFF2-40B4-BE49-F238E27FC236}">
+                    <a16:creationId xmlns:a16="http://schemas.microsoft.com/office/drawing/2014/main" id="{0FE0BAE8-1A30-4F38-6546-D1BE99A6B8A0}"/>
+                  </a:ext>
+                </a:extLst>
+              </p:cNvPr>
+              <p:cNvPicPr/>
+              <p:nvPr/>
+            </p:nvPicPr>
+            <p:blipFill>
+              <a:blip r:embed="rId5"/>
+              <a:stretch>
+                <a:fillRect/>
+              </a:stretch>
+            </p:blipFill>
+            <p:spPr>
+              <a:xfrm>
+                <a:off x="-1915499" y="866414"/>
+                <a:ext cx="18000" cy="18000"/>
+              </a:xfrm>
+              <a:prstGeom prst="rect">
+                <a:avLst/>
+              </a:prstGeom>
+            </p:spPr>
+          </p:pic>
+        </mc:Fallback>
+      </mc:AlternateContent>
+      <p:sp>
+        <p:nvSpPr>
+          <p:cNvPr id="26" name="Espace réservé de la date 1">
+            <a:extLst>
+              <a:ext uri="{FF2B5EF4-FFF2-40B4-BE49-F238E27FC236}">
+                <a16:creationId xmlns:a16="http://schemas.microsoft.com/office/drawing/2014/main" id="{C6669101-CB46-67AE-C88C-76663AB4E9A9}"/>
+              </a:ext>
+            </a:extLst>
+          </p:cNvPr>
+          <p:cNvSpPr>
+            <a:spLocks noGrp="1"/>
+          </p:cNvSpPr>
+          <p:nvPr>
+            <p:ph type="dt" sz="half" idx="10"/>
+          </p:nvPr>
+        </p:nvSpPr>
+        <p:spPr>
+          <a:xfrm>
+            <a:off x="146304" y="6387463"/>
+            <a:ext cx="2743200" cy="365125"/>
+          </a:xfrm>
+        </p:spPr>
+        <p:txBody>
+          <a:bodyPr/>
+          <a:lstStyle/>
+          <a:p>
+            <a:fld id="{5E865842-71E2-4BC3-BAAB-AD09CA53D33D}" type="datetime1">
+              <a:rPr lang="fr-FR" smtClean="0">
+                <a:solidFill>
+                  <a:schemeClr val="tx2">
+                    <a:lumMod val="10000"/>
+                    <a:lumOff val="90000"/>
+                  </a:schemeClr>
+                </a:solidFill>
+              </a:rPr>
+              <a:t>05/05/2024</a:t>
+            </a:fld>
+            <a:endParaRPr lang="fr-FR" dirty="0">
+              <a:solidFill>
+                <a:schemeClr val="tx2">
+                  <a:lumMod val="10000"/>
+                  <a:lumOff val="90000"/>
+                </a:schemeClr>
+              </a:solidFill>
+            </a:endParaRPr>
+          </a:p>
+        </p:txBody>
+      </p:sp>
+      <p:sp>
+        <p:nvSpPr>
+          <p:cNvPr id="27" name="Espace réservé du pied de page 2">
+            <a:extLst>
+              <a:ext uri="{FF2B5EF4-FFF2-40B4-BE49-F238E27FC236}">
+                <a16:creationId xmlns:a16="http://schemas.microsoft.com/office/drawing/2014/main" id="{72B1AC60-8463-DF7C-FDED-196A2941AC22}"/>
+              </a:ext>
+            </a:extLst>
+          </p:cNvPr>
+          <p:cNvSpPr>
+            <a:spLocks noGrp="1"/>
+          </p:cNvSpPr>
+          <p:nvPr>
+            <p:ph type="ftr" sz="quarter" idx="11"/>
+          </p:nvPr>
+        </p:nvSpPr>
+        <p:spPr>
+          <a:xfrm>
+            <a:off x="4038600" y="6356350"/>
+            <a:ext cx="4114800" cy="365125"/>
+          </a:xfrm>
+        </p:spPr>
+        <p:txBody>
+          <a:bodyPr/>
+          <a:lstStyle/>
+          <a:p>
+            <a:r>
+              <a:rPr lang="fr-FR" dirty="0">
+                <a:solidFill>
+                  <a:schemeClr val="tx2">
+                    <a:lumMod val="10000"/>
+                    <a:lumOff val="90000"/>
+                  </a:schemeClr>
+                </a:solidFill>
+              </a:rPr>
+              <a:t>Mohamed</a:t>
+            </a:r>
+            <a:r>
+              <a:rPr lang="fr-FR" dirty="0"/>
+              <a:t> </a:t>
+            </a:r>
+            <a:r>
+              <a:rPr lang="fr-FR" dirty="0">
+                <a:solidFill>
+                  <a:schemeClr val="tx2">
+                    <a:lumMod val="10000"/>
+                    <a:lumOff val="90000"/>
+                  </a:schemeClr>
+                </a:solidFill>
+              </a:rPr>
+              <a:t>Hammouda</a:t>
+            </a:r>
+          </a:p>
+        </p:txBody>
+      </p:sp>
+      <p:sp>
+        <p:nvSpPr>
+          <p:cNvPr id="28" name="Espace réservé du numéro de diapositive 3">
+            <a:extLst>
+              <a:ext uri="{FF2B5EF4-FFF2-40B4-BE49-F238E27FC236}">
+                <a16:creationId xmlns:a16="http://schemas.microsoft.com/office/drawing/2014/main" id="{FA3BD6CA-14D1-39A7-480C-A5CE17E5DC40}"/>
+              </a:ext>
+            </a:extLst>
+          </p:cNvPr>
+          <p:cNvSpPr>
+            <a:spLocks noGrp="1"/>
+          </p:cNvSpPr>
+          <p:nvPr>
+            <p:ph type="sldNum" sz="quarter" idx="12"/>
+          </p:nvPr>
+        </p:nvSpPr>
+        <p:spPr>
+          <a:xfrm>
+            <a:off x="9195816" y="6326504"/>
+            <a:ext cx="2743200" cy="365125"/>
+          </a:xfrm>
+        </p:spPr>
+        <p:txBody>
+          <a:bodyPr/>
+          <a:lstStyle/>
+          <a:p>
+            <a:fld id="{B880C63E-E5E0-484B-A84B-0348264AB81D}" type="slidenum">
+              <a:rPr lang="fr-FR" b="1" smtClean="0">
+                <a:solidFill>
+                  <a:schemeClr val="tx2">
+                    <a:lumMod val="10000"/>
+                    <a:lumOff val="90000"/>
+                  </a:schemeClr>
+                </a:solidFill>
+              </a:rPr>
+              <a:t>14</a:t>
+            </a:fld>
+            <a:endParaRPr lang="fr-FR" b="1" dirty="0">
+              <a:solidFill>
+                <a:schemeClr val="tx2">
+                  <a:lumMod val="10000"/>
+                  <a:lumOff val="90000"/>
+                </a:schemeClr>
+              </a:solidFill>
+            </a:endParaRPr>
+          </a:p>
+        </p:txBody>
+      </p:sp>
+      <mc:AlternateContent xmlns:mc="http://schemas.openxmlformats.org/markup-compatibility/2006">
+        <mc:Choice xmlns:p14="http://schemas.microsoft.com/office/powerpoint/2010/main" Requires="p14">
+          <p:contentPart p14:bwMode="auto" r:id="rId6">
+            <p14:nvContentPartPr>
+              <p14:cNvPr id="32" name="Encre 31">
+                <a:extLst>
+                  <a:ext uri="{FF2B5EF4-FFF2-40B4-BE49-F238E27FC236}">
+                    <a16:creationId xmlns:a16="http://schemas.microsoft.com/office/drawing/2014/main" id="{0B3FB5B7-CA5D-9E93-566B-B018FF5AC323}"/>
+                  </a:ext>
+                </a:extLst>
+              </p14:cNvPr>
+              <p14:cNvContentPartPr/>
+              <p14:nvPr/>
+            </p14:nvContentPartPr>
+            <p14:xfrm>
+              <a:off x="13393501" y="4249694"/>
+              <a:ext cx="360" cy="360"/>
+            </p14:xfrm>
+          </p:contentPart>
+        </mc:Choice>
+        <mc:Fallback>
+          <p:pic>
+            <p:nvPicPr>
+              <p:cNvPr id="32" name="Encre 31">
+                <a:extLst>
+                  <a:ext uri="{FF2B5EF4-FFF2-40B4-BE49-F238E27FC236}">
+                    <a16:creationId xmlns:a16="http://schemas.microsoft.com/office/drawing/2014/main" id="{0B3FB5B7-CA5D-9E93-566B-B018FF5AC323}"/>
+                  </a:ext>
+                </a:extLst>
+              </p:cNvPr>
+              <p:cNvPicPr/>
+              <p:nvPr/>
+            </p:nvPicPr>
+            <p:blipFill>
+              <a:blip r:embed="rId7"/>
+              <a:stretch>
+                <a:fillRect/>
+              </a:stretch>
+            </p:blipFill>
+            <p:spPr>
+              <a:xfrm>
+                <a:off x="13384501" y="4240694"/>
+                <a:ext cx="18000" cy="18000"/>
+              </a:xfrm>
+              <a:prstGeom prst="rect">
+                <a:avLst/>
+              </a:prstGeom>
+            </p:spPr>
+          </p:pic>
+        </mc:Fallback>
+      </mc:AlternateContent>
+    </p:spTree>
+    <p:extLst>
+      <p:ext uri="{BB962C8B-B14F-4D97-AF65-F5344CB8AC3E}">
+        <p14:creationId xmlns:p14="http://schemas.microsoft.com/office/powerpoint/2010/main" val="3951446037"/>
       </p:ext>
     </p:extLst>
   </p:cSld>
@@ -17115,7 +19110,7 @@
                   </a:schemeClr>
                 </a:solidFill>
               </a:rPr>
-              <a:t>02/05/2024</a:t>
+              <a:t>04/05/2024</a:t>
             </a:fld>
             <a:endParaRPr lang="fr-FR" dirty="0">
               <a:solidFill>
@@ -17838,7 +19833,7 @@
                   </a:schemeClr>
                 </a:solidFill>
               </a:rPr>
-              <a:t>02/05/2024</a:t>
+              <a:t>04/05/2024</a:t>
             </a:fld>
             <a:endParaRPr lang="fr-FR" dirty="0">
               <a:solidFill>
@@ -18501,7 +20496,7 @@
                   </a:schemeClr>
                 </a:solidFill>
               </a:rPr>
-              <a:t>02/05/2024</a:t>
+              <a:t>04/05/2024</a:t>
             </a:fld>
             <a:endParaRPr lang="fr-FR" dirty="0">
               <a:solidFill>
@@ -23219,7 +25214,7 @@
                   </a:schemeClr>
                 </a:solidFill>
               </a:rPr>
-              <a:t>02/05/2024</a:t>
+              <a:t>04/05/2024</a:t>
             </a:fld>
             <a:endParaRPr lang="fr-FR" dirty="0">
               <a:solidFill>
@@ -23733,7 +25728,7 @@
                   </a:schemeClr>
                 </a:solidFill>
               </a:rPr>
-              <a:t>02/05/2024</a:t>
+              <a:t>04/05/2024</a:t>
             </a:fld>
             <a:endParaRPr lang="fr-FR" dirty="0">
               <a:solidFill>
@@ -25725,7 +27720,7 @@
                   </a:schemeClr>
                 </a:solidFill>
               </a:rPr>
-              <a:t>02/05/2024</a:t>
+              <a:t>04/05/2024</a:t>
             </a:fld>
             <a:endParaRPr lang="fr-FR" dirty="0">
               <a:solidFill>
@@ -28511,7 +30506,7 @@
                   </a:schemeClr>
                 </a:solidFill>
               </a:rPr>
-              <a:t>02/05/2024</a:t>
+              <a:t>04/05/2024</a:t>
             </a:fld>
             <a:endParaRPr lang="fr-FR" dirty="0">
               <a:solidFill>
@@ -29366,8 +31361,8 @@
           </a:p>
         </p:txBody>
       </p:sp>
-      <mc:AlternateContent xmlns:mc="http://schemas.openxmlformats.org/markup-compatibility/2006">
-        <mc:Choice xmlns:p14="http://schemas.microsoft.com/office/powerpoint/2010/main" Requires="p14">
+      <mc:AlternateContent xmlns:mc="http://schemas.openxmlformats.org/markup-compatibility/2006" xmlns:p14="http://schemas.microsoft.com/office/powerpoint/2010/main">
+        <mc:Choice Requires="p14">
           <p:contentPart p14:bwMode="auto" r:id="rId6">
             <p14:nvContentPartPr>
               <p14:cNvPr id="20" name="Encre 19">
@@ -29386,7 +31381,7 @@
             </p14:xfrm>
           </p:contentPart>
         </mc:Choice>
-        <mc:Fallback>
+        <mc:Fallback xmlns="">
           <p:pic>
             <p:nvPicPr>
               <p:cNvPr id="20" name="Encre 19">
@@ -29417,8 +31412,8 @@
           </p:pic>
         </mc:Fallback>
       </mc:AlternateContent>
-      <mc:AlternateContent xmlns:mc="http://schemas.openxmlformats.org/markup-compatibility/2006">
-        <mc:Choice xmlns:p14="http://schemas.microsoft.com/office/powerpoint/2010/main" Requires="p14">
+      <mc:AlternateContent xmlns:mc="http://schemas.openxmlformats.org/markup-compatibility/2006" xmlns:p14="http://schemas.microsoft.com/office/powerpoint/2010/main">
+        <mc:Choice Requires="p14">
           <p:contentPart p14:bwMode="auto" r:id="rId8">
             <p14:nvContentPartPr>
               <p14:cNvPr id="21" name="Encre 20">
@@ -29437,7 +31432,7 @@
             </p14:xfrm>
           </p:contentPart>
         </mc:Choice>
-        <mc:Fallback>
+        <mc:Fallback xmlns="">
           <p:pic>
             <p:nvPicPr>
               <p:cNvPr id="21" name="Encre 20">
@@ -29564,7 +31559,7 @@
                   </a:schemeClr>
                 </a:solidFill>
               </a:rPr>
-              <a:t>02/05/2024</a:t>
+              <a:t>04/05/2024</a:t>
             </a:fld>
             <a:endParaRPr lang="fr-FR" dirty="0">
               <a:solidFill>
@@ -29680,8 +31675,8 @@
           </a:p>
         </p:txBody>
       </p:sp>
-      <mc:AlternateContent xmlns:mc="http://schemas.openxmlformats.org/markup-compatibility/2006">
-        <mc:Choice xmlns:p14="http://schemas.microsoft.com/office/powerpoint/2010/main" Requires="p14">
+      <mc:AlternateContent xmlns:mc="http://schemas.openxmlformats.org/markup-compatibility/2006" xmlns:p14="http://schemas.microsoft.com/office/powerpoint/2010/main">
+        <mc:Choice Requires="p14">
           <p:contentPart p14:bwMode="auto" r:id="rId10">
             <p14:nvContentPartPr>
               <p14:cNvPr id="32" name="Encre 31">
@@ -29700,7 +31695,7 @@
             </p14:xfrm>
           </p:contentPart>
         </mc:Choice>
-        <mc:Fallback>
+        <mc:Fallback xmlns="">
           <p:pic>
             <p:nvPicPr>
               <p:cNvPr id="32" name="Encre 31">

</xml_diff>